<commit_message>
de cuong version 0.5 (update steps and image steps - 80%)
</commit_message>
<xml_diff>
--- a/De Cuong/cac buoc/process steps.pptx
+++ b/De Cuong/cac buoc/process steps.pptx
@@ -885,18 +885,32 @@
             <a:t>(tách từ, gán nhãn, xác </a:t>
           </a:r>
           <a:r>
-            <a:rPr lang="en-US" smtClean="0">
+            <a:rPr lang="en-US" dirty="0" err="1" smtClean="0">
               <a:latin typeface="Times New Roman" pitchFamily="18" charset="0"/>
               <a:cs typeface="Times New Roman" pitchFamily="18" charset="0"/>
             </a:rPr>
-            <a:t>định thực </a:t>
+            <a:t>định</a:t>
           </a:r>
           <a:r>
             <a:rPr lang="en-US" dirty="0" smtClean="0">
               <a:latin typeface="Times New Roman" pitchFamily="18" charset="0"/>
               <a:cs typeface="Times New Roman" pitchFamily="18" charset="0"/>
             </a:rPr>
-            <a:t>thể đặt tên )</a:t>
+            <a:t> </a:t>
+          </a:r>
+          <a:r>
+            <a:rPr lang="en-US" dirty="0" err="1" smtClean="0">
+              <a:latin typeface="Times New Roman" pitchFamily="18" charset="0"/>
+              <a:cs typeface="Times New Roman" pitchFamily="18" charset="0"/>
+            </a:rPr>
+            <a:t>thực</a:t>
+          </a:r>
+          <a:r>
+            <a:rPr lang="en-US" dirty="0" smtClean="0">
+              <a:latin typeface="Times New Roman" pitchFamily="18" charset="0"/>
+              <a:cs typeface="Times New Roman" pitchFamily="18" charset="0"/>
+            </a:rPr>
+            <a:t> thể đặt tên )</a:t>
           </a:r>
           <a:endParaRPr lang="en-US" dirty="0">
             <a:latin typeface="Times New Roman" pitchFamily="18" charset="0"/>
@@ -942,7 +956,181 @@
               <a:latin typeface="Times New Roman" pitchFamily="18" charset="0"/>
               <a:cs typeface="Times New Roman" pitchFamily="18" charset="0"/>
             </a:rPr>
-            <a:t>Liệt kê các bộ ba quan hệ về từ</a:t>
+            <a:t>Liệt kê các bộ ba quan hệ </a:t>
+          </a:r>
+          <a:r>
+            <a:rPr lang="en-US" dirty="0" err="1" smtClean="0">
+              <a:latin typeface="Times New Roman" pitchFamily="18" charset="0"/>
+              <a:cs typeface="Times New Roman" pitchFamily="18" charset="0"/>
+            </a:rPr>
+            <a:t>về</a:t>
+          </a:r>
+          <a:r>
+            <a:rPr lang="en-US" dirty="0" smtClean="0">
+              <a:latin typeface="Times New Roman" pitchFamily="18" charset="0"/>
+              <a:cs typeface="Times New Roman" pitchFamily="18" charset="0"/>
+            </a:rPr>
+            <a:t> </a:t>
+          </a:r>
+          <a:r>
+            <a:rPr lang="en-US" dirty="0" err="1" smtClean="0">
+              <a:latin typeface="Times New Roman" pitchFamily="18" charset="0"/>
+              <a:cs typeface="Times New Roman" pitchFamily="18" charset="0"/>
+            </a:rPr>
+            <a:t>từ</a:t>
+          </a:r>
+          <a:endParaRPr lang="en-US" dirty="0" smtClean="0">
+            <a:latin typeface="Times New Roman" pitchFamily="18" charset="0"/>
+            <a:cs typeface="Times New Roman" pitchFamily="18" charset="0"/>
+          </a:endParaRPr>
+        </a:p>
+        <a:p>
+          <a:r>
+            <a:rPr lang="en-US" dirty="0" smtClean="0">
+              <a:latin typeface="Times New Roman" pitchFamily="18" charset="0"/>
+              <a:cs typeface="Times New Roman" pitchFamily="18" charset="0"/>
+            </a:rPr>
+            <a:t>(</a:t>
+          </a:r>
+          <a:r>
+            <a:rPr lang="en-US" dirty="0" err="1" smtClean="0">
+              <a:latin typeface="Times New Roman" pitchFamily="18" charset="0"/>
+              <a:cs typeface="Times New Roman" pitchFamily="18" charset="0"/>
+            </a:rPr>
+            <a:t>liệt</a:t>
+          </a:r>
+          <a:r>
+            <a:rPr lang="en-US" dirty="0" smtClean="0">
+              <a:latin typeface="Times New Roman" pitchFamily="18" charset="0"/>
+              <a:cs typeface="Times New Roman" pitchFamily="18" charset="0"/>
+            </a:rPr>
+            <a:t> </a:t>
+          </a:r>
+          <a:r>
+            <a:rPr lang="en-US" dirty="0" err="1" smtClean="0">
+              <a:latin typeface="Times New Roman" pitchFamily="18" charset="0"/>
+              <a:cs typeface="Times New Roman" pitchFamily="18" charset="0"/>
+            </a:rPr>
+            <a:t>kê</a:t>
+          </a:r>
+          <a:r>
+            <a:rPr lang="en-US" dirty="0" smtClean="0">
+              <a:latin typeface="Times New Roman" pitchFamily="18" charset="0"/>
+              <a:cs typeface="Times New Roman" pitchFamily="18" charset="0"/>
+            </a:rPr>
+            <a:t> </a:t>
+          </a:r>
+          <a:r>
+            <a:rPr lang="en-US" dirty="0" err="1" smtClean="0">
+              <a:latin typeface="Times New Roman" pitchFamily="18" charset="0"/>
+              <a:cs typeface="Times New Roman" pitchFamily="18" charset="0"/>
+            </a:rPr>
+            <a:t>các</a:t>
+          </a:r>
+          <a:r>
+            <a:rPr lang="en-US" dirty="0" smtClean="0">
+              <a:latin typeface="Times New Roman" pitchFamily="18" charset="0"/>
+              <a:cs typeface="Times New Roman" pitchFamily="18" charset="0"/>
+            </a:rPr>
+            <a:t> </a:t>
+          </a:r>
+          <a:r>
+            <a:rPr lang="en-US" dirty="0" err="1" smtClean="0">
+              <a:latin typeface="Times New Roman" pitchFamily="18" charset="0"/>
+              <a:cs typeface="Times New Roman" pitchFamily="18" charset="0"/>
+            </a:rPr>
+            <a:t>bộ</a:t>
+          </a:r>
+          <a:r>
+            <a:rPr lang="en-US" dirty="0" smtClean="0">
+              <a:latin typeface="Times New Roman" pitchFamily="18" charset="0"/>
+              <a:cs typeface="Times New Roman" pitchFamily="18" charset="0"/>
+            </a:rPr>
+            <a:t> </a:t>
+          </a:r>
+          <a:r>
+            <a:rPr lang="en-US" dirty="0" err="1" smtClean="0">
+              <a:latin typeface="Times New Roman" pitchFamily="18" charset="0"/>
+              <a:cs typeface="Times New Roman" pitchFamily="18" charset="0"/>
+            </a:rPr>
+            <a:t>ba</a:t>
+          </a:r>
+          <a:r>
+            <a:rPr lang="en-US" dirty="0" smtClean="0">
+              <a:latin typeface="Times New Roman" pitchFamily="18" charset="0"/>
+              <a:cs typeface="Times New Roman" pitchFamily="18" charset="0"/>
+            </a:rPr>
+            <a:t>, </a:t>
+          </a:r>
+          <a:r>
+            <a:rPr lang="en-US" dirty="0" err="1" smtClean="0">
+              <a:latin typeface="Times New Roman" pitchFamily="18" charset="0"/>
+              <a:cs typeface="Times New Roman" pitchFamily="18" charset="0"/>
+            </a:rPr>
+            <a:t>nhận</a:t>
+          </a:r>
+          <a:r>
+            <a:rPr lang="en-US" dirty="0" smtClean="0">
+              <a:latin typeface="Times New Roman" pitchFamily="18" charset="0"/>
+              <a:cs typeface="Times New Roman" pitchFamily="18" charset="0"/>
+            </a:rPr>
+            <a:t> </a:t>
+          </a:r>
+          <a:r>
+            <a:rPr lang="en-US" dirty="0" err="1" smtClean="0">
+              <a:latin typeface="Times New Roman" pitchFamily="18" charset="0"/>
+              <a:cs typeface="Times New Roman" pitchFamily="18" charset="0"/>
+            </a:rPr>
+            <a:t>diện</a:t>
+          </a:r>
+          <a:r>
+            <a:rPr lang="en-US" dirty="0" smtClean="0">
+              <a:latin typeface="Times New Roman" pitchFamily="18" charset="0"/>
+              <a:cs typeface="Times New Roman" pitchFamily="18" charset="0"/>
+            </a:rPr>
+            <a:t> </a:t>
+          </a:r>
+          <a:r>
+            <a:rPr lang="en-US" dirty="0" err="1" smtClean="0">
+              <a:latin typeface="Times New Roman" pitchFamily="18" charset="0"/>
+              <a:cs typeface="Times New Roman" pitchFamily="18" charset="0"/>
+            </a:rPr>
+            <a:t>quan</a:t>
+          </a:r>
+          <a:r>
+            <a:rPr lang="en-US" dirty="0" smtClean="0">
+              <a:latin typeface="Times New Roman" pitchFamily="18" charset="0"/>
+              <a:cs typeface="Times New Roman" pitchFamily="18" charset="0"/>
+            </a:rPr>
+            <a:t> </a:t>
+          </a:r>
+          <a:r>
+            <a:rPr lang="en-US" dirty="0" err="1" smtClean="0">
+              <a:latin typeface="Times New Roman" pitchFamily="18" charset="0"/>
+              <a:cs typeface="Times New Roman" pitchFamily="18" charset="0"/>
+            </a:rPr>
+            <a:t>hệ</a:t>
+          </a:r>
+          <a:r>
+            <a:rPr lang="en-US" dirty="0" smtClean="0">
+              <a:latin typeface="Times New Roman" pitchFamily="18" charset="0"/>
+              <a:cs typeface="Times New Roman" pitchFamily="18" charset="0"/>
+            </a:rPr>
+            <a:t> </a:t>
+          </a:r>
+          <a:r>
+            <a:rPr lang="en-US" dirty="0" err="1" smtClean="0">
+              <a:latin typeface="Times New Roman" pitchFamily="18" charset="0"/>
+              <a:cs typeface="Times New Roman" pitchFamily="18" charset="0"/>
+            </a:rPr>
+            <a:t>ẩn</a:t>
+          </a:r>
+          <a:r>
+            <a:rPr lang="en-US" dirty="0" smtClean="0">
+              <a:latin typeface="Times New Roman" pitchFamily="18" charset="0"/>
+              <a:cs typeface="Times New Roman" pitchFamily="18" charset="0"/>
+            </a:rPr>
+            <a:t>)</a:t>
           </a:r>
           <a:endParaRPr lang="en-US" dirty="0">
             <a:latin typeface="Times New Roman" pitchFamily="18" charset="0"/>
@@ -984,11 +1172,39 @@
         <a:lstStyle/>
         <a:p>
           <a:r>
+            <a:rPr lang="en-US" dirty="0" err="1" smtClean="0">
+              <a:latin typeface="Times New Roman" pitchFamily="18" charset="0"/>
+              <a:cs typeface="Times New Roman" pitchFamily="18" charset="0"/>
+            </a:rPr>
+            <a:t>Nhận</a:t>
+          </a:r>
+          <a:r>
             <a:rPr lang="en-US" dirty="0" smtClean="0">
               <a:latin typeface="Times New Roman" pitchFamily="18" charset="0"/>
               <a:cs typeface="Times New Roman" pitchFamily="18" charset="0"/>
             </a:rPr>
-            <a:t>Nhận diện lại thực thể</a:t>
+            <a:t> </a:t>
+          </a:r>
+          <a:r>
+            <a:rPr lang="en-US" dirty="0" err="1" smtClean="0">
+              <a:latin typeface="Times New Roman" pitchFamily="18" charset="0"/>
+              <a:cs typeface="Times New Roman" pitchFamily="18" charset="0"/>
+            </a:rPr>
+            <a:t>diện</a:t>
+          </a:r>
+          <a:r>
+            <a:rPr lang="en-US" dirty="0" smtClean="0">
+              <a:latin typeface="Times New Roman" pitchFamily="18" charset="0"/>
+              <a:cs typeface="Times New Roman" pitchFamily="18" charset="0"/>
+            </a:rPr>
+            <a:t> </a:t>
+          </a:r>
+          <a:r>
+            <a:rPr lang="en-US" dirty="0" smtClean="0">
+              <a:latin typeface="Times New Roman" pitchFamily="18" charset="0"/>
+              <a:cs typeface="Times New Roman" pitchFamily="18" charset="0"/>
+            </a:rPr>
+            <a:t>thực thể</a:t>
           </a:r>
           <a:endParaRPr lang="en-US" dirty="0">
             <a:latin typeface="Times New Roman" pitchFamily="18" charset="0"/>
@@ -1009,52 +1225,6 @@
       </dgm:t>
     </dgm:pt>
     <dgm:pt modelId="{62BD4F90-76A6-4612-90D8-D94593503944}" type="sibTrans" cxnId="{A5CBA9E7-8FDA-464B-AE02-6A6FE82B7250}">
-      <dgm:prSet/>
-      <dgm:spPr/>
-      <dgm:t>
-        <a:bodyPr/>
-        <a:lstStyle/>
-        <a:p>
-          <a:endParaRPr lang="en-US">
-            <a:latin typeface="Times New Roman" pitchFamily="18" charset="0"/>
-            <a:cs typeface="Times New Roman" pitchFamily="18" charset="0"/>
-          </a:endParaRPr>
-        </a:p>
-      </dgm:t>
-    </dgm:pt>
-    <dgm:pt modelId="{9A697C93-F70B-49BD-B412-99057D8EE74B}">
-      <dgm:prSet/>
-      <dgm:spPr/>
-      <dgm:t>
-        <a:bodyPr/>
-        <a:lstStyle/>
-        <a:p>
-          <a:r>
-            <a:rPr lang="en-US" dirty="0" smtClean="0">
-              <a:latin typeface="Times New Roman" pitchFamily="18" charset="0"/>
-              <a:cs typeface="Times New Roman" pitchFamily="18" charset="0"/>
-            </a:rPr>
-            <a:t>Nhận diện quan hệ ẩn</a:t>
-          </a:r>
-          <a:endParaRPr lang="en-US" dirty="0">
-            <a:latin typeface="Times New Roman" pitchFamily="18" charset="0"/>
-            <a:cs typeface="Times New Roman" pitchFamily="18" charset="0"/>
-          </a:endParaRPr>
-        </a:p>
-      </dgm:t>
-    </dgm:pt>
-    <dgm:pt modelId="{1DC485AD-C940-4283-BA58-C4F6B0CFA4DE}" type="parTrans" cxnId="{76E8B4AD-3167-4EDB-A439-4634FAD80B9C}">
-      <dgm:prSet/>
-      <dgm:spPr/>
-      <dgm:t>
-        <a:bodyPr/>
-        <a:lstStyle/>
-        <a:p>
-          <a:endParaRPr lang="en-US"/>
-        </a:p>
-      </dgm:t>
-    </dgm:pt>
-    <dgm:pt modelId="{6D9DFCD4-7507-4F0A-8FB4-5FD81ABC9858}" type="sibTrans" cxnId="{76E8B4AD-3167-4EDB-A439-4634FAD80B9C}">
       <dgm:prSet/>
       <dgm:spPr/>
       <dgm:t>
@@ -1120,7 +1290,7 @@
       <dgm:spPr/>
     </dgm:pt>
     <dgm:pt modelId="{120F9BAC-D73D-4896-9BB0-40EFD102C933}" type="pres">
-      <dgm:prSet presAssocID="{C338B8CD-E314-48DF-838A-9678B83FA221}" presName="node" presStyleLbl="node1" presStyleIdx="0" presStyleCnt="5" custScaleX="118154">
+      <dgm:prSet presAssocID="{C338B8CD-E314-48DF-838A-9678B83FA221}" presName="node" presStyleLbl="node1" presStyleIdx="0" presStyleCnt="4" custScaleX="118154">
         <dgm:presLayoutVars>
           <dgm:bulletEnabled val="1"/>
         </dgm:presLayoutVars>
@@ -1139,15 +1309,29 @@
       </dgm:t>
     </dgm:pt>
     <dgm:pt modelId="{AAE06282-6344-42F3-94BC-B1E824288EAB}" type="pres">
-      <dgm:prSet presAssocID="{F7EE5203-B160-4D37-B60F-1C623D5AA0E0}" presName="sibTrans" presStyleLbl="sibTrans2D1" presStyleIdx="0" presStyleCnt="4"/>
+      <dgm:prSet presAssocID="{F7EE5203-B160-4D37-B60F-1C623D5AA0E0}" presName="sibTrans" presStyleLbl="sibTrans2D1" presStyleIdx="0" presStyleCnt="3"/>
       <dgm:spPr/>
+      <dgm:t>
+        <a:bodyPr/>
+        <a:lstStyle/>
+        <a:p>
+          <a:endParaRPr lang="en-US"/>
+        </a:p>
+      </dgm:t>
     </dgm:pt>
     <dgm:pt modelId="{331F05E1-1792-4BBD-829F-61999F2FEB43}" type="pres">
-      <dgm:prSet presAssocID="{F7EE5203-B160-4D37-B60F-1C623D5AA0E0}" presName="connectorText" presStyleLbl="sibTrans2D1" presStyleIdx="0" presStyleCnt="4"/>
+      <dgm:prSet presAssocID="{F7EE5203-B160-4D37-B60F-1C623D5AA0E0}" presName="connectorText" presStyleLbl="sibTrans2D1" presStyleIdx="0" presStyleCnt="3"/>
       <dgm:spPr/>
+      <dgm:t>
+        <a:bodyPr/>
+        <a:lstStyle/>
+        <a:p>
+          <a:endParaRPr lang="en-US"/>
+        </a:p>
+      </dgm:t>
     </dgm:pt>
     <dgm:pt modelId="{2D1C8598-2B5B-4AA3-8E36-2F03079472FF}" type="pres">
-      <dgm:prSet presAssocID="{478929E2-99EC-4AE0-AFE7-1AAF21D8B622}" presName="node" presStyleLbl="node1" presStyleIdx="1" presStyleCnt="5">
+      <dgm:prSet presAssocID="{478929E2-99EC-4AE0-AFE7-1AAF21D8B622}" presName="node" presStyleLbl="node1" presStyleIdx="1" presStyleCnt="4">
         <dgm:presLayoutVars>
           <dgm:bulletEnabled val="1"/>
         </dgm:presLayoutVars>
@@ -1162,15 +1346,29 @@
       </dgm:t>
     </dgm:pt>
     <dgm:pt modelId="{3C66EC79-7A1A-4ED2-9C35-02A322D1B7FE}" type="pres">
-      <dgm:prSet presAssocID="{67108C0B-BD79-4C86-A2E4-78DABE280CF0}" presName="sibTrans" presStyleLbl="sibTrans2D1" presStyleIdx="1" presStyleCnt="4"/>
+      <dgm:prSet presAssocID="{67108C0B-BD79-4C86-A2E4-78DABE280CF0}" presName="sibTrans" presStyleLbl="sibTrans2D1" presStyleIdx="1" presStyleCnt="3"/>
       <dgm:spPr/>
+      <dgm:t>
+        <a:bodyPr/>
+        <a:lstStyle/>
+        <a:p>
+          <a:endParaRPr lang="en-US"/>
+        </a:p>
+      </dgm:t>
     </dgm:pt>
     <dgm:pt modelId="{247C4D88-C257-4291-90F5-2F0233267DB3}" type="pres">
-      <dgm:prSet presAssocID="{67108C0B-BD79-4C86-A2E4-78DABE280CF0}" presName="connectorText" presStyleLbl="sibTrans2D1" presStyleIdx="1" presStyleCnt="4"/>
+      <dgm:prSet presAssocID="{67108C0B-BD79-4C86-A2E4-78DABE280CF0}" presName="connectorText" presStyleLbl="sibTrans2D1" presStyleIdx="1" presStyleCnt="3"/>
       <dgm:spPr/>
+      <dgm:t>
+        <a:bodyPr/>
+        <a:lstStyle/>
+        <a:p>
+          <a:endParaRPr lang="en-US"/>
+        </a:p>
+      </dgm:t>
     </dgm:pt>
     <dgm:pt modelId="{2C8E7DB9-DCB7-4BCC-9886-19B1340507D7}" type="pres">
-      <dgm:prSet presAssocID="{3439D3EC-A90B-48B4-8EA8-6DEA5D73F37B}" presName="node" presStyleLbl="node1" presStyleIdx="2" presStyleCnt="5">
+      <dgm:prSet presAssocID="{3439D3EC-A90B-48B4-8EA8-6DEA5D73F37B}" presName="node" presStyleLbl="node1" presStyleIdx="2" presStyleCnt="4">
         <dgm:presLayoutVars>
           <dgm:bulletEnabled val="1"/>
         </dgm:presLayoutVars>
@@ -1185,19 +1383,7 @@
       </dgm:t>
     </dgm:pt>
     <dgm:pt modelId="{053F948B-7C8E-40B9-96A3-5E94C3021AA5}" type="pres">
-      <dgm:prSet presAssocID="{62BD4F90-76A6-4612-90D8-D94593503944}" presName="sibTrans" presStyleLbl="sibTrans2D1" presStyleIdx="2" presStyleCnt="4"/>
-      <dgm:spPr/>
-    </dgm:pt>
-    <dgm:pt modelId="{9BACAF84-635B-4545-A9C8-E22E6E65E02E}" type="pres">
-      <dgm:prSet presAssocID="{62BD4F90-76A6-4612-90D8-D94593503944}" presName="connectorText" presStyleLbl="sibTrans2D1" presStyleIdx="2" presStyleCnt="4"/>
-      <dgm:spPr/>
-    </dgm:pt>
-    <dgm:pt modelId="{09429C49-7F3C-4610-ADA5-123E3B1776BA}" type="pres">
-      <dgm:prSet presAssocID="{9A697C93-F70B-49BD-B412-99057D8EE74B}" presName="node" presStyleLbl="node1" presStyleIdx="3" presStyleCnt="5">
-        <dgm:presLayoutVars>
-          <dgm:bulletEnabled val="1"/>
-        </dgm:presLayoutVars>
-      </dgm:prSet>
+      <dgm:prSet presAssocID="{62BD4F90-76A6-4612-90D8-D94593503944}" presName="sibTrans" presStyleLbl="sibTrans2D1" presStyleIdx="2" presStyleCnt="3"/>
       <dgm:spPr/>
       <dgm:t>
         <a:bodyPr/>
@@ -1207,16 +1393,19 @@
         </a:p>
       </dgm:t>
     </dgm:pt>
-    <dgm:pt modelId="{1472E23C-3887-4C9D-99D9-E6316022395F}" type="pres">
-      <dgm:prSet presAssocID="{6D9DFCD4-7507-4F0A-8FB4-5FD81ABC9858}" presName="sibTrans" presStyleLbl="sibTrans2D1" presStyleIdx="3" presStyleCnt="4"/>
+    <dgm:pt modelId="{9BACAF84-635B-4545-A9C8-E22E6E65E02E}" type="pres">
+      <dgm:prSet presAssocID="{62BD4F90-76A6-4612-90D8-D94593503944}" presName="connectorText" presStyleLbl="sibTrans2D1" presStyleIdx="2" presStyleCnt="3"/>
       <dgm:spPr/>
-    </dgm:pt>
-    <dgm:pt modelId="{ECAEC7F2-4750-4F64-820D-F40192278A05}" type="pres">
-      <dgm:prSet presAssocID="{6D9DFCD4-7507-4F0A-8FB4-5FD81ABC9858}" presName="connectorText" presStyleLbl="sibTrans2D1" presStyleIdx="3" presStyleCnt="4"/>
-      <dgm:spPr/>
+      <dgm:t>
+        <a:bodyPr/>
+        <a:lstStyle/>
+        <a:p>
+          <a:endParaRPr lang="en-US"/>
+        </a:p>
+      </dgm:t>
     </dgm:pt>
     <dgm:pt modelId="{1FE9FCF1-8C00-4B5E-AE32-8BBB25BF1CEC}" type="pres">
-      <dgm:prSet presAssocID="{B9A2E75C-2A37-4F05-8B10-C43D4038B601}" presName="node" presStyleLbl="node1" presStyleIdx="4" presStyleCnt="5">
+      <dgm:prSet presAssocID="{B9A2E75C-2A37-4F05-8B10-C43D4038B601}" presName="node" presStyleLbl="node1" presStyleIdx="3" presStyleCnt="4">
         <dgm:presLayoutVars>
           <dgm:bulletEnabled val="1"/>
         </dgm:presLayoutVars>
@@ -1232,25 +1421,21 @@
     </dgm:pt>
   </dgm:ptLst>
   <dgm:cxnLst>
-    <dgm:cxn modelId="{76E8B4AD-3167-4EDB-A439-4634FAD80B9C}" srcId="{0EBE70D1-20C7-4FE7-814C-39809FB9290B}" destId="{9A697C93-F70B-49BD-B412-99057D8EE74B}" srcOrd="3" destOrd="0" parTransId="{1DC485AD-C940-4283-BA58-C4F6B0CFA4DE}" sibTransId="{6D9DFCD4-7507-4F0A-8FB4-5FD81ABC9858}"/>
     <dgm:cxn modelId="{721589C9-B10D-43DB-BCA1-604AB36B74FD}" type="presOf" srcId="{B9A2E75C-2A37-4F05-8B10-C43D4038B601}" destId="{1FE9FCF1-8C00-4B5E-AE32-8BBB25BF1CEC}" srcOrd="0" destOrd="0" presId="urn:microsoft.com/office/officeart/2005/8/layout/process2"/>
-    <dgm:cxn modelId="{A2D1C9F7-4298-4601-801A-35BABCF68B75}" type="presOf" srcId="{6D9DFCD4-7507-4F0A-8FB4-5FD81ABC9858}" destId="{1472E23C-3887-4C9D-99D9-E6316022395F}" srcOrd="0" destOrd="0" presId="urn:microsoft.com/office/officeart/2005/8/layout/process2"/>
+    <dgm:cxn modelId="{5F753FDB-3AE2-4856-9C11-CDD2C7A20504}" srcId="{0EBE70D1-20C7-4FE7-814C-39809FB9290B}" destId="{478929E2-99EC-4AE0-AFE7-1AAF21D8B622}" srcOrd="1" destOrd="0" parTransId="{29C3939D-FE7D-4B99-BC12-16D81A776031}" sibTransId="{67108C0B-BD79-4C86-A2E4-78DABE280CF0}"/>
+    <dgm:cxn modelId="{A0D01E85-7E0C-41C2-AD65-1E268A47EA12}" type="presOf" srcId="{F7EE5203-B160-4D37-B60F-1C623D5AA0E0}" destId="{AAE06282-6344-42F3-94BC-B1E824288EAB}" srcOrd="0" destOrd="0" presId="urn:microsoft.com/office/officeart/2005/8/layout/process2"/>
+    <dgm:cxn modelId="{D035FD12-F27A-42E1-B0F0-C92A88AB77DB}" type="presOf" srcId="{67108C0B-BD79-4C86-A2E4-78DABE280CF0}" destId="{247C4D88-C257-4291-90F5-2F0233267DB3}" srcOrd="1" destOrd="0" presId="urn:microsoft.com/office/officeart/2005/8/layout/process2"/>
+    <dgm:cxn modelId="{B3AB96B2-941E-4C46-9CBC-660735820737}" type="presOf" srcId="{62BD4F90-76A6-4612-90D8-D94593503944}" destId="{053F948B-7C8E-40B9-96A3-5E94C3021AA5}" srcOrd="0" destOrd="0" presId="urn:microsoft.com/office/officeart/2005/8/layout/process2"/>
+    <dgm:cxn modelId="{6F9ADF0A-FD6F-4223-9915-0740AD692EC8}" srcId="{0EBE70D1-20C7-4FE7-814C-39809FB9290B}" destId="{C338B8CD-E314-48DF-838A-9678B83FA221}" srcOrd="0" destOrd="0" parTransId="{40867C9C-EDAC-4D93-B345-6A3F09C6F17B}" sibTransId="{F7EE5203-B160-4D37-B60F-1C623D5AA0E0}"/>
+    <dgm:cxn modelId="{3A343D1A-2DDC-4331-9F41-75000945508D}" srcId="{0EBE70D1-20C7-4FE7-814C-39809FB9290B}" destId="{B9A2E75C-2A37-4F05-8B10-C43D4038B601}" srcOrd="3" destOrd="0" parTransId="{6DEB5F52-C259-4304-826C-03A03ADEAF68}" sibTransId="{60D96DE8-4CFD-4559-94BD-FA28AB9AAE76}"/>
+    <dgm:cxn modelId="{68FA08D6-4FAA-4B82-B28B-1D04B023B6F7}" type="presOf" srcId="{62BD4F90-76A6-4612-90D8-D94593503944}" destId="{9BACAF84-635B-4545-A9C8-E22E6E65E02E}" srcOrd="1" destOrd="0" presId="urn:microsoft.com/office/officeart/2005/8/layout/process2"/>
+    <dgm:cxn modelId="{2BF18CAE-576D-46AF-AD0B-E8DC35D7A5B6}" type="presOf" srcId="{67108C0B-BD79-4C86-A2E4-78DABE280CF0}" destId="{3C66EC79-7A1A-4ED2-9C35-02A322D1B7FE}" srcOrd="0" destOrd="0" presId="urn:microsoft.com/office/officeart/2005/8/layout/process2"/>
+    <dgm:cxn modelId="{86CCCD49-C976-4FF7-9630-023CFD529736}" type="presOf" srcId="{3439D3EC-A90B-48B4-8EA8-6DEA5D73F37B}" destId="{2C8E7DB9-DCB7-4BCC-9886-19B1340507D7}" srcOrd="0" destOrd="0" presId="urn:microsoft.com/office/officeart/2005/8/layout/process2"/>
+    <dgm:cxn modelId="{8AE61842-16A9-42A6-B150-D972D3ED0869}" type="presOf" srcId="{478929E2-99EC-4AE0-AFE7-1AAF21D8B622}" destId="{2D1C8598-2B5B-4AA3-8E36-2F03079472FF}" srcOrd="0" destOrd="0" presId="urn:microsoft.com/office/officeart/2005/8/layout/process2"/>
     <dgm:cxn modelId="{9B941D3E-911B-442E-AA48-B67C4858C4F8}" type="presOf" srcId="{C338B8CD-E314-48DF-838A-9678B83FA221}" destId="{120F9BAC-D73D-4896-9BB0-40EFD102C933}" srcOrd="0" destOrd="0" presId="urn:microsoft.com/office/officeart/2005/8/layout/process2"/>
-    <dgm:cxn modelId="{5F753FDB-3AE2-4856-9C11-CDD2C7A20504}" srcId="{0EBE70D1-20C7-4FE7-814C-39809FB9290B}" destId="{478929E2-99EC-4AE0-AFE7-1AAF21D8B622}" srcOrd="1" destOrd="0" parTransId="{29C3939D-FE7D-4B99-BC12-16D81A776031}" sibTransId="{67108C0B-BD79-4C86-A2E4-78DABE280CF0}"/>
-    <dgm:cxn modelId="{8AE61842-16A9-42A6-B150-D972D3ED0869}" type="presOf" srcId="{478929E2-99EC-4AE0-AFE7-1AAF21D8B622}" destId="{2D1C8598-2B5B-4AA3-8E36-2F03079472FF}" srcOrd="0" destOrd="0" presId="urn:microsoft.com/office/officeart/2005/8/layout/process2"/>
-    <dgm:cxn modelId="{A0D01E85-7E0C-41C2-AD65-1E268A47EA12}" type="presOf" srcId="{F7EE5203-B160-4D37-B60F-1C623D5AA0E0}" destId="{AAE06282-6344-42F3-94BC-B1E824288EAB}" srcOrd="0" destOrd="0" presId="urn:microsoft.com/office/officeart/2005/8/layout/process2"/>
+    <dgm:cxn modelId="{A5CBA9E7-8FDA-464B-AE02-6A6FE82B7250}" srcId="{0EBE70D1-20C7-4FE7-814C-39809FB9290B}" destId="{3439D3EC-A90B-48B4-8EA8-6DEA5D73F37B}" srcOrd="2" destOrd="0" parTransId="{8546BDE4-C2A0-4C13-9007-3B52C88A8727}" sibTransId="{62BD4F90-76A6-4612-90D8-D94593503944}"/>
     <dgm:cxn modelId="{CEFA06EA-90D2-4B87-870E-EDEE60CD131D}" type="presOf" srcId="{F7EE5203-B160-4D37-B60F-1C623D5AA0E0}" destId="{331F05E1-1792-4BBD-829F-61999F2FEB43}" srcOrd="1" destOrd="0" presId="urn:microsoft.com/office/officeart/2005/8/layout/process2"/>
-    <dgm:cxn modelId="{4A5D7273-7DD2-45E9-8481-03C708635789}" type="presOf" srcId="{9A697C93-F70B-49BD-B412-99057D8EE74B}" destId="{09429C49-7F3C-4610-ADA5-123E3B1776BA}" srcOrd="0" destOrd="0" presId="urn:microsoft.com/office/officeart/2005/8/layout/process2"/>
-    <dgm:cxn modelId="{A5CBA9E7-8FDA-464B-AE02-6A6FE82B7250}" srcId="{0EBE70D1-20C7-4FE7-814C-39809FB9290B}" destId="{3439D3EC-A90B-48B4-8EA8-6DEA5D73F37B}" srcOrd="2" destOrd="0" parTransId="{8546BDE4-C2A0-4C13-9007-3B52C88A8727}" sibTransId="{62BD4F90-76A6-4612-90D8-D94593503944}"/>
-    <dgm:cxn modelId="{3A2945F2-777F-494A-AAE4-7312A6F06E30}" type="presOf" srcId="{6D9DFCD4-7507-4F0A-8FB4-5FD81ABC9858}" destId="{ECAEC7F2-4750-4F64-820D-F40192278A05}" srcOrd="1" destOrd="0" presId="urn:microsoft.com/office/officeart/2005/8/layout/process2"/>
-    <dgm:cxn modelId="{68FA08D6-4FAA-4B82-B28B-1D04B023B6F7}" type="presOf" srcId="{62BD4F90-76A6-4612-90D8-D94593503944}" destId="{9BACAF84-635B-4545-A9C8-E22E6E65E02E}" srcOrd="1" destOrd="0" presId="urn:microsoft.com/office/officeart/2005/8/layout/process2"/>
-    <dgm:cxn modelId="{6F9ADF0A-FD6F-4223-9915-0740AD692EC8}" srcId="{0EBE70D1-20C7-4FE7-814C-39809FB9290B}" destId="{C338B8CD-E314-48DF-838A-9678B83FA221}" srcOrd="0" destOrd="0" parTransId="{40867C9C-EDAC-4D93-B345-6A3F09C6F17B}" sibTransId="{F7EE5203-B160-4D37-B60F-1C623D5AA0E0}"/>
-    <dgm:cxn modelId="{D035FD12-F27A-42E1-B0F0-C92A88AB77DB}" type="presOf" srcId="{67108C0B-BD79-4C86-A2E4-78DABE280CF0}" destId="{247C4D88-C257-4291-90F5-2F0233267DB3}" srcOrd="1" destOrd="0" presId="urn:microsoft.com/office/officeart/2005/8/layout/process2"/>
-    <dgm:cxn modelId="{86CCCD49-C976-4FF7-9630-023CFD529736}" type="presOf" srcId="{3439D3EC-A90B-48B4-8EA8-6DEA5D73F37B}" destId="{2C8E7DB9-DCB7-4BCC-9886-19B1340507D7}" srcOrd="0" destOrd="0" presId="urn:microsoft.com/office/officeart/2005/8/layout/process2"/>
-    <dgm:cxn modelId="{B3AB96B2-941E-4C46-9CBC-660735820737}" type="presOf" srcId="{62BD4F90-76A6-4612-90D8-D94593503944}" destId="{053F948B-7C8E-40B9-96A3-5E94C3021AA5}" srcOrd="0" destOrd="0" presId="urn:microsoft.com/office/officeart/2005/8/layout/process2"/>
     <dgm:cxn modelId="{D015D72B-D670-4FBA-BEB4-B1832C7CA693}" type="presOf" srcId="{0EBE70D1-20C7-4FE7-814C-39809FB9290B}" destId="{4104CF59-F3EC-4A54-9679-E9C89C83A957}" srcOrd="0" destOrd="0" presId="urn:microsoft.com/office/officeart/2005/8/layout/process2"/>
-    <dgm:cxn modelId="{2BF18CAE-576D-46AF-AD0B-E8DC35D7A5B6}" type="presOf" srcId="{67108C0B-BD79-4C86-A2E4-78DABE280CF0}" destId="{3C66EC79-7A1A-4ED2-9C35-02A322D1B7FE}" srcOrd="0" destOrd="0" presId="urn:microsoft.com/office/officeart/2005/8/layout/process2"/>
-    <dgm:cxn modelId="{3A343D1A-2DDC-4331-9F41-75000945508D}" srcId="{0EBE70D1-20C7-4FE7-814C-39809FB9290B}" destId="{B9A2E75C-2A37-4F05-8B10-C43D4038B601}" srcOrd="4" destOrd="0" parTransId="{6DEB5F52-C259-4304-826C-03A03ADEAF68}" sibTransId="{60D96DE8-4CFD-4559-94BD-FA28AB9AAE76}"/>
     <dgm:cxn modelId="{D94AA7F5-4E53-4A59-88BF-6B26A89523EF}" type="presParOf" srcId="{4104CF59-F3EC-4A54-9679-E9C89C83A957}" destId="{120F9BAC-D73D-4896-9BB0-40EFD102C933}" srcOrd="0" destOrd="0" presId="urn:microsoft.com/office/officeart/2005/8/layout/process2"/>
     <dgm:cxn modelId="{88F6C42C-C38C-4016-BD5F-5FA446907AC6}" type="presParOf" srcId="{4104CF59-F3EC-4A54-9679-E9C89C83A957}" destId="{AAE06282-6344-42F3-94BC-B1E824288EAB}" srcOrd="1" destOrd="0" presId="urn:microsoft.com/office/officeart/2005/8/layout/process2"/>
     <dgm:cxn modelId="{AB233745-C444-4189-9E10-6EF90D452BE3}" type="presParOf" srcId="{AAE06282-6344-42F3-94BC-B1E824288EAB}" destId="{331F05E1-1792-4BBD-829F-61999F2FEB43}" srcOrd="0" destOrd="0" presId="urn:microsoft.com/office/officeart/2005/8/layout/process2"/>
@@ -1260,10 +1445,7 @@
     <dgm:cxn modelId="{46BCE20D-7D39-4BEB-AC2B-5FEABD79B821}" type="presParOf" srcId="{4104CF59-F3EC-4A54-9679-E9C89C83A957}" destId="{2C8E7DB9-DCB7-4BCC-9886-19B1340507D7}" srcOrd="4" destOrd="0" presId="urn:microsoft.com/office/officeart/2005/8/layout/process2"/>
     <dgm:cxn modelId="{2CB9EED5-A27B-4AE0-8178-340167B7D43D}" type="presParOf" srcId="{4104CF59-F3EC-4A54-9679-E9C89C83A957}" destId="{053F948B-7C8E-40B9-96A3-5E94C3021AA5}" srcOrd="5" destOrd="0" presId="urn:microsoft.com/office/officeart/2005/8/layout/process2"/>
     <dgm:cxn modelId="{BBFDFA91-3027-4E30-ACF0-FD9FFE118E54}" type="presParOf" srcId="{053F948B-7C8E-40B9-96A3-5E94C3021AA5}" destId="{9BACAF84-635B-4545-A9C8-E22E6E65E02E}" srcOrd="0" destOrd="0" presId="urn:microsoft.com/office/officeart/2005/8/layout/process2"/>
-    <dgm:cxn modelId="{9483F47A-DB12-4E8C-8394-12EA7E641E57}" type="presParOf" srcId="{4104CF59-F3EC-4A54-9679-E9C89C83A957}" destId="{09429C49-7F3C-4610-ADA5-123E3B1776BA}" srcOrd="6" destOrd="0" presId="urn:microsoft.com/office/officeart/2005/8/layout/process2"/>
-    <dgm:cxn modelId="{C6D88221-9FED-4F84-8273-CFB07395B2C8}" type="presParOf" srcId="{4104CF59-F3EC-4A54-9679-E9C89C83A957}" destId="{1472E23C-3887-4C9D-99D9-E6316022395F}" srcOrd="7" destOrd="0" presId="urn:microsoft.com/office/officeart/2005/8/layout/process2"/>
-    <dgm:cxn modelId="{ACA425AE-5B6F-4562-8BAD-6739D874AD51}" type="presParOf" srcId="{1472E23C-3887-4C9D-99D9-E6316022395F}" destId="{ECAEC7F2-4750-4F64-820D-F40192278A05}" srcOrd="0" destOrd="0" presId="urn:microsoft.com/office/officeart/2005/8/layout/process2"/>
-    <dgm:cxn modelId="{E5D7C217-B722-427C-ACF9-FA58EA153FCA}" type="presParOf" srcId="{4104CF59-F3EC-4A54-9679-E9C89C83A957}" destId="{1FE9FCF1-8C00-4B5E-AE32-8BBB25BF1CEC}" srcOrd="8" destOrd="0" presId="urn:microsoft.com/office/officeart/2005/8/layout/process2"/>
+    <dgm:cxn modelId="{E5D7C217-B722-427C-ACF9-FA58EA153FCA}" type="presParOf" srcId="{4104CF59-F3EC-4A54-9679-E9C89C83A957}" destId="{1FE9FCF1-8C00-4B5E-AE32-8BBB25BF1CEC}" srcOrd="6" destOrd="0" presId="urn:microsoft.com/office/officeart/2005/8/layout/process2"/>
   </dgm:cxnLst>
   <dgm:bg/>
   <dgm:whole/>
@@ -2661,7 +2843,7 @@
             <a:fld id="{1D8BD707-D9CF-40AE-B4C6-C98DA3205C09}" type="datetimeFigureOut">
               <a:rPr lang="en-US" smtClean="0"/>
               <a:pPr/>
-              <a:t>10/21/2010</a:t>
+              <a:t>10/29/2010</a:t>
             </a:fld>
             <a:endParaRPr lang="en-US"/>
           </a:p>
@@ -2828,7 +3010,7 @@
             <a:fld id="{1D8BD707-D9CF-40AE-B4C6-C98DA3205C09}" type="datetimeFigureOut">
               <a:rPr lang="en-US" smtClean="0"/>
               <a:pPr/>
-              <a:t>10/21/2010</a:t>
+              <a:t>10/29/2010</a:t>
             </a:fld>
             <a:endParaRPr lang="en-US"/>
           </a:p>
@@ -3005,7 +3187,7 @@
             <a:fld id="{1D8BD707-D9CF-40AE-B4C6-C98DA3205C09}" type="datetimeFigureOut">
               <a:rPr lang="en-US" smtClean="0"/>
               <a:pPr/>
-              <a:t>10/21/2010</a:t>
+              <a:t>10/29/2010</a:t>
             </a:fld>
             <a:endParaRPr lang="en-US"/>
           </a:p>
@@ -3172,7 +3354,7 @@
             <a:fld id="{1D8BD707-D9CF-40AE-B4C6-C98DA3205C09}" type="datetimeFigureOut">
               <a:rPr lang="en-US" smtClean="0"/>
               <a:pPr/>
-              <a:t>10/21/2010</a:t>
+              <a:t>10/29/2010</a:t>
             </a:fld>
             <a:endParaRPr lang="en-US"/>
           </a:p>
@@ -3415,7 +3597,7 @@
             <a:fld id="{1D8BD707-D9CF-40AE-B4C6-C98DA3205C09}" type="datetimeFigureOut">
               <a:rPr lang="en-US" smtClean="0"/>
               <a:pPr/>
-              <a:t>10/21/2010</a:t>
+              <a:t>10/29/2010</a:t>
             </a:fld>
             <a:endParaRPr lang="en-US"/>
           </a:p>
@@ -3700,7 +3882,7 @@
             <a:fld id="{1D8BD707-D9CF-40AE-B4C6-C98DA3205C09}" type="datetimeFigureOut">
               <a:rPr lang="en-US" smtClean="0"/>
               <a:pPr/>
-              <a:t>10/21/2010</a:t>
+              <a:t>10/29/2010</a:t>
             </a:fld>
             <a:endParaRPr lang="en-US"/>
           </a:p>
@@ -4119,7 +4301,7 @@
             <a:fld id="{1D8BD707-D9CF-40AE-B4C6-C98DA3205C09}" type="datetimeFigureOut">
               <a:rPr lang="en-US" smtClean="0"/>
               <a:pPr/>
-              <a:t>10/21/2010</a:t>
+              <a:t>10/29/2010</a:t>
             </a:fld>
             <a:endParaRPr lang="en-US"/>
           </a:p>
@@ -4234,7 +4416,7 @@
             <a:fld id="{1D8BD707-D9CF-40AE-B4C6-C98DA3205C09}" type="datetimeFigureOut">
               <a:rPr lang="en-US" smtClean="0"/>
               <a:pPr/>
-              <a:t>10/21/2010</a:t>
+              <a:t>10/29/2010</a:t>
             </a:fld>
             <a:endParaRPr lang="en-US"/>
           </a:p>
@@ -4326,7 +4508,7 @@
             <a:fld id="{1D8BD707-D9CF-40AE-B4C6-C98DA3205C09}" type="datetimeFigureOut">
               <a:rPr lang="en-US" smtClean="0"/>
               <a:pPr/>
-              <a:t>10/21/2010</a:t>
+              <a:t>10/29/2010</a:t>
             </a:fld>
             <a:endParaRPr lang="en-US"/>
           </a:p>
@@ -4600,7 +4782,7 @@
             <a:fld id="{1D8BD707-D9CF-40AE-B4C6-C98DA3205C09}" type="datetimeFigureOut">
               <a:rPr lang="en-US" smtClean="0"/>
               <a:pPr/>
-              <a:t>10/21/2010</a:t>
+              <a:t>10/29/2010</a:t>
             </a:fld>
             <a:endParaRPr lang="en-US"/>
           </a:p>
@@ -4850,7 +5032,7 @@
             <a:fld id="{1D8BD707-D9CF-40AE-B4C6-C98DA3205C09}" type="datetimeFigureOut">
               <a:rPr lang="en-US" smtClean="0"/>
               <a:pPr/>
-              <a:t>10/21/2010</a:t>
+              <a:t>10/29/2010</a:t>
             </a:fld>
             <a:endParaRPr lang="en-US"/>
           </a:p>
@@ -5060,7 +5242,7 @@
             <a:fld id="{1D8BD707-D9CF-40AE-B4C6-C98DA3205C09}" type="datetimeFigureOut">
               <a:rPr lang="en-US" smtClean="0"/>
               <a:pPr/>
-              <a:t>10/21/2010</a:t>
+              <a:t>10/29/2010</a:t>
             </a:fld>
             <a:endParaRPr lang="en-US"/>
           </a:p>

</xml_diff>

<commit_message>
FINISH REPORT VERSION 1.7 (SAu khi nhận xét) - Mở đầu phương pháp
</commit_message>
<xml_diff>
--- a/De Cuong/cac buoc/process steps.pptx
+++ b/De Cuong/cac buoc/process steps.pptx
@@ -882,35 +882,35 @@
               <a:latin typeface="Times New Roman" pitchFamily="18" charset="0"/>
               <a:cs typeface="Times New Roman" pitchFamily="18" charset="0"/>
             </a:rPr>
-            <a:t>(tách từ, gán nhãn, xác </a:t>
+            <a:t>(tách từ, </a:t>
           </a:r>
           <a:r>
-            <a:rPr lang="en-US" dirty="0" err="1" smtClean="0">
+            <a:rPr lang="vi-VN" dirty="0" smtClean="0">
               <a:latin typeface="Times New Roman" pitchFamily="18" charset="0"/>
               <a:cs typeface="Times New Roman" pitchFamily="18" charset="0"/>
             </a:rPr>
-            <a:t>định</a:t>
+            <a:t>giữ lại các cụm từ cần thiết và </a:t>
           </a:r>
           <a:r>
             <a:rPr lang="en-US" dirty="0" smtClean="0">
               <a:latin typeface="Times New Roman" pitchFamily="18" charset="0"/>
               <a:cs typeface="Times New Roman" pitchFamily="18" charset="0"/>
             </a:rPr>
-            <a:t> </a:t>
+            <a:t>gán nhãn</a:t>
           </a:r>
           <a:r>
-            <a:rPr lang="en-US" dirty="0" err="1" smtClean="0">
+            <a:rPr lang="vi-VN" dirty="0" smtClean="0">
               <a:latin typeface="Times New Roman" pitchFamily="18" charset="0"/>
               <a:cs typeface="Times New Roman" pitchFamily="18" charset="0"/>
             </a:rPr>
-            <a:t>thực</a:t>
+            <a:t> từ loại</a:t>
           </a:r>
           <a:r>
             <a:rPr lang="en-US" dirty="0" smtClean="0">
               <a:latin typeface="Times New Roman" pitchFamily="18" charset="0"/>
               <a:cs typeface="Times New Roman" pitchFamily="18" charset="0"/>
             </a:rPr>
-            <a:t> thể đặt tên )</a:t>
+            <a:t>)</a:t>
           </a:r>
           <a:endParaRPr lang="en-US" dirty="0">
             <a:latin typeface="Times New Roman" pitchFamily="18" charset="0"/>
@@ -952,18 +952,11 @@
         <a:lstStyle/>
         <a:p>
           <a:r>
-            <a:rPr lang="en-US" dirty="0" smtClean="0">
+            <a:rPr lang="vi-VN" dirty="0" smtClean="0">
               <a:latin typeface="Times New Roman" pitchFamily="18" charset="0"/>
               <a:cs typeface="Times New Roman" pitchFamily="18" charset="0"/>
             </a:rPr>
-            <a:t>Liệt kê các bộ ba quan hệ </a:t>
-          </a:r>
-          <a:r>
-            <a:rPr lang="en-US" dirty="0" err="1" smtClean="0">
-              <a:latin typeface="Times New Roman" pitchFamily="18" charset="0"/>
-              <a:cs typeface="Times New Roman" pitchFamily="18" charset="0"/>
-            </a:rPr>
-            <a:t>về</a:t>
+            <a:t>Rút</a:t>
           </a:r>
           <a:r>
             <a:rPr lang="en-US" dirty="0" smtClean="0">
@@ -973,166 +966,20 @@
             <a:t> </a:t>
           </a:r>
           <a:r>
-            <a:rPr lang="en-US" dirty="0" err="1" smtClean="0">
+            <a:rPr lang="en-US" dirty="0" smtClean="0">
+              <a:latin typeface="Times New Roman" pitchFamily="18" charset="0"/>
+              <a:cs typeface="Times New Roman" pitchFamily="18" charset="0"/>
+            </a:rPr>
+            <a:t>các bộ ba quan hệ về </a:t>
+          </a:r>
+          <a:r>
+            <a:rPr lang="en-US" dirty="0" smtClean="0">
               <a:latin typeface="Times New Roman" pitchFamily="18" charset="0"/>
               <a:cs typeface="Times New Roman" pitchFamily="18" charset="0"/>
             </a:rPr>
             <a:t>từ</a:t>
           </a:r>
           <a:endParaRPr lang="en-US" dirty="0" smtClean="0">
-            <a:latin typeface="Times New Roman" pitchFamily="18" charset="0"/>
-            <a:cs typeface="Times New Roman" pitchFamily="18" charset="0"/>
-          </a:endParaRPr>
-        </a:p>
-        <a:p>
-          <a:r>
-            <a:rPr lang="en-US" dirty="0" smtClean="0">
-              <a:latin typeface="Times New Roman" pitchFamily="18" charset="0"/>
-              <a:cs typeface="Times New Roman" pitchFamily="18" charset="0"/>
-            </a:rPr>
-            <a:t>(</a:t>
-          </a:r>
-          <a:r>
-            <a:rPr lang="en-US" dirty="0" err="1" smtClean="0">
-              <a:latin typeface="Times New Roman" pitchFamily="18" charset="0"/>
-              <a:cs typeface="Times New Roman" pitchFamily="18" charset="0"/>
-            </a:rPr>
-            <a:t>liệt</a:t>
-          </a:r>
-          <a:r>
-            <a:rPr lang="en-US" dirty="0" smtClean="0">
-              <a:latin typeface="Times New Roman" pitchFamily="18" charset="0"/>
-              <a:cs typeface="Times New Roman" pitchFamily="18" charset="0"/>
-            </a:rPr>
-            <a:t> </a:t>
-          </a:r>
-          <a:r>
-            <a:rPr lang="en-US" dirty="0" err="1" smtClean="0">
-              <a:latin typeface="Times New Roman" pitchFamily="18" charset="0"/>
-              <a:cs typeface="Times New Roman" pitchFamily="18" charset="0"/>
-            </a:rPr>
-            <a:t>kê</a:t>
-          </a:r>
-          <a:r>
-            <a:rPr lang="en-US" dirty="0" smtClean="0">
-              <a:latin typeface="Times New Roman" pitchFamily="18" charset="0"/>
-              <a:cs typeface="Times New Roman" pitchFamily="18" charset="0"/>
-            </a:rPr>
-            <a:t> </a:t>
-          </a:r>
-          <a:r>
-            <a:rPr lang="en-US" dirty="0" err="1" smtClean="0">
-              <a:latin typeface="Times New Roman" pitchFamily="18" charset="0"/>
-              <a:cs typeface="Times New Roman" pitchFamily="18" charset="0"/>
-            </a:rPr>
-            <a:t>các</a:t>
-          </a:r>
-          <a:r>
-            <a:rPr lang="en-US" dirty="0" smtClean="0">
-              <a:latin typeface="Times New Roman" pitchFamily="18" charset="0"/>
-              <a:cs typeface="Times New Roman" pitchFamily="18" charset="0"/>
-            </a:rPr>
-            <a:t> </a:t>
-          </a:r>
-          <a:r>
-            <a:rPr lang="en-US" dirty="0" err="1" smtClean="0">
-              <a:latin typeface="Times New Roman" pitchFamily="18" charset="0"/>
-              <a:cs typeface="Times New Roman" pitchFamily="18" charset="0"/>
-            </a:rPr>
-            <a:t>bộ</a:t>
-          </a:r>
-          <a:r>
-            <a:rPr lang="en-US" dirty="0" smtClean="0">
-              <a:latin typeface="Times New Roman" pitchFamily="18" charset="0"/>
-              <a:cs typeface="Times New Roman" pitchFamily="18" charset="0"/>
-            </a:rPr>
-            <a:t> </a:t>
-          </a:r>
-          <a:r>
-            <a:rPr lang="en-US" dirty="0" err="1" smtClean="0">
-              <a:latin typeface="Times New Roman" pitchFamily="18" charset="0"/>
-              <a:cs typeface="Times New Roman" pitchFamily="18" charset="0"/>
-            </a:rPr>
-            <a:t>ba</a:t>
-          </a:r>
-          <a:r>
-            <a:rPr lang="en-US" dirty="0" smtClean="0">
-              <a:latin typeface="Times New Roman" pitchFamily="18" charset="0"/>
-              <a:cs typeface="Times New Roman" pitchFamily="18" charset="0"/>
-            </a:rPr>
-            <a:t>, </a:t>
-          </a:r>
-          <a:r>
-            <a:rPr lang="en-US" dirty="0" err="1" smtClean="0">
-              <a:latin typeface="Times New Roman" pitchFamily="18" charset="0"/>
-              <a:cs typeface="Times New Roman" pitchFamily="18" charset="0"/>
-            </a:rPr>
-            <a:t>nhận</a:t>
-          </a:r>
-          <a:r>
-            <a:rPr lang="en-US" dirty="0" smtClean="0">
-              <a:latin typeface="Times New Roman" pitchFamily="18" charset="0"/>
-              <a:cs typeface="Times New Roman" pitchFamily="18" charset="0"/>
-            </a:rPr>
-            <a:t> </a:t>
-          </a:r>
-          <a:r>
-            <a:rPr lang="en-US" dirty="0" err="1" smtClean="0">
-              <a:latin typeface="Times New Roman" pitchFamily="18" charset="0"/>
-              <a:cs typeface="Times New Roman" pitchFamily="18" charset="0"/>
-            </a:rPr>
-            <a:t>diện</a:t>
-          </a:r>
-          <a:r>
-            <a:rPr lang="en-US" dirty="0" smtClean="0">
-              <a:latin typeface="Times New Roman" pitchFamily="18" charset="0"/>
-              <a:cs typeface="Times New Roman" pitchFamily="18" charset="0"/>
-            </a:rPr>
-            <a:t> </a:t>
-          </a:r>
-          <a:r>
-            <a:rPr lang="en-US" dirty="0" err="1" smtClean="0">
-              <a:latin typeface="Times New Roman" pitchFamily="18" charset="0"/>
-              <a:cs typeface="Times New Roman" pitchFamily="18" charset="0"/>
-            </a:rPr>
-            <a:t>quan</a:t>
-          </a:r>
-          <a:r>
-            <a:rPr lang="en-US" dirty="0" smtClean="0">
-              <a:latin typeface="Times New Roman" pitchFamily="18" charset="0"/>
-              <a:cs typeface="Times New Roman" pitchFamily="18" charset="0"/>
-            </a:rPr>
-            <a:t> </a:t>
-          </a:r>
-          <a:r>
-            <a:rPr lang="en-US" dirty="0" err="1" smtClean="0">
-              <a:latin typeface="Times New Roman" pitchFamily="18" charset="0"/>
-              <a:cs typeface="Times New Roman" pitchFamily="18" charset="0"/>
-            </a:rPr>
-            <a:t>hệ</a:t>
-          </a:r>
-          <a:r>
-            <a:rPr lang="en-US" dirty="0" smtClean="0">
-              <a:latin typeface="Times New Roman" pitchFamily="18" charset="0"/>
-              <a:cs typeface="Times New Roman" pitchFamily="18" charset="0"/>
-            </a:rPr>
-            <a:t> </a:t>
-          </a:r>
-          <a:r>
-            <a:rPr lang="en-US" dirty="0" err="1" smtClean="0">
-              <a:latin typeface="Times New Roman" pitchFamily="18" charset="0"/>
-              <a:cs typeface="Times New Roman" pitchFamily="18" charset="0"/>
-            </a:rPr>
-            <a:t>ẩn</a:t>
-          </a:r>
-          <a:r>
-            <a:rPr lang="en-US" dirty="0" smtClean="0">
-              <a:latin typeface="Times New Roman" pitchFamily="18" charset="0"/>
-              <a:cs typeface="Times New Roman" pitchFamily="18" charset="0"/>
-            </a:rPr>
-            <a:t>)</a:t>
-          </a:r>
-          <a:endParaRPr lang="en-US" dirty="0">
             <a:latin typeface="Times New Roman" pitchFamily="18" charset="0"/>
             <a:cs typeface="Times New Roman" pitchFamily="18" charset="0"/>
           </a:endParaRPr>
@@ -1172,39 +1019,25 @@
         <a:lstStyle/>
         <a:p>
           <a:r>
-            <a:rPr lang="en-US" dirty="0" err="1" smtClean="0">
+            <a:rPr lang="en-US" dirty="0" smtClean="0">
               <a:latin typeface="Times New Roman" pitchFamily="18" charset="0"/>
               <a:cs typeface="Times New Roman" pitchFamily="18" charset="0"/>
             </a:rPr>
-            <a:t>Nhận</a:t>
+            <a:t>Nhận diện thực </a:t>
           </a:r>
           <a:r>
             <a:rPr lang="en-US" dirty="0" smtClean="0">
               <a:latin typeface="Times New Roman" pitchFamily="18" charset="0"/>
               <a:cs typeface="Times New Roman" pitchFamily="18" charset="0"/>
             </a:rPr>
-            <a:t> </a:t>
+            <a:t>thể</a:t>
           </a:r>
           <a:r>
-            <a:rPr lang="en-US" dirty="0" err="1" smtClean="0">
+            <a:rPr lang="vi-VN" dirty="0" smtClean="0">
               <a:latin typeface="Times New Roman" pitchFamily="18" charset="0"/>
               <a:cs typeface="Times New Roman" pitchFamily="18" charset="0"/>
             </a:rPr>
-            <a:t>diện</a:t>
-          </a:r>
-          <a:r>
-            <a:rPr lang="en-US" dirty="0" smtClean="0">
-              <a:latin typeface="Times New Roman" pitchFamily="18" charset="0"/>
-              <a:cs typeface="Times New Roman" pitchFamily="18" charset="0"/>
-            </a:rPr>
-            <a:t> </a:t>
-          </a:r>
-          <a:r>
-            <a:rPr lang="en-US" dirty="0" smtClean="0">
-              <a:latin typeface="Times New Roman" pitchFamily="18" charset="0"/>
-              <a:cs typeface="Times New Roman" pitchFamily="18" charset="0"/>
-            </a:rPr>
-            <a:t>thực thể</a:t>
+            <a:t> trong bộ ba (có và không đặt tên)</a:t>
           </a:r>
           <a:endParaRPr lang="en-US" dirty="0">
             <a:latin typeface="Times New Roman" pitchFamily="18" charset="0"/>
@@ -1250,7 +1083,21 @@
               <a:latin typeface="Times New Roman" pitchFamily="18" charset="0"/>
               <a:cs typeface="Times New Roman" pitchFamily="18" charset="0"/>
             </a:rPr>
-            <a:t>Sinh câu truy vấn</a:t>
+            <a:t>Sinh câu truy </a:t>
+          </a:r>
+          <a:r>
+            <a:rPr lang="en-US" dirty="0" smtClean="0">
+              <a:latin typeface="Times New Roman" pitchFamily="18" charset="0"/>
+              <a:cs typeface="Times New Roman" pitchFamily="18" charset="0"/>
+            </a:rPr>
+            <a:t>vấn</a:t>
+          </a:r>
+          <a:r>
+            <a:rPr lang="vi-VN" dirty="0" smtClean="0">
+              <a:latin typeface="Times New Roman" pitchFamily="18" charset="0"/>
+              <a:cs typeface="Times New Roman" pitchFamily="18" charset="0"/>
+            </a:rPr>
+            <a:t> SQL</a:t>
           </a:r>
           <a:endParaRPr lang="en-US" dirty="0">
             <a:latin typeface="Times New Roman" pitchFamily="18" charset="0"/>
@@ -2843,7 +2690,7 @@
             <a:fld id="{1D8BD707-D9CF-40AE-B4C6-C98DA3205C09}" type="datetimeFigureOut">
               <a:rPr lang="en-US" smtClean="0"/>
               <a:pPr/>
-              <a:t>10/29/2010</a:t>
+              <a:t>3/10/2011</a:t>
             </a:fld>
             <a:endParaRPr lang="en-US"/>
           </a:p>
@@ -3010,7 +2857,7 @@
             <a:fld id="{1D8BD707-D9CF-40AE-B4C6-C98DA3205C09}" type="datetimeFigureOut">
               <a:rPr lang="en-US" smtClean="0"/>
               <a:pPr/>
-              <a:t>10/29/2010</a:t>
+              <a:t>3/10/2011</a:t>
             </a:fld>
             <a:endParaRPr lang="en-US"/>
           </a:p>
@@ -3187,7 +3034,7 @@
             <a:fld id="{1D8BD707-D9CF-40AE-B4C6-C98DA3205C09}" type="datetimeFigureOut">
               <a:rPr lang="en-US" smtClean="0"/>
               <a:pPr/>
-              <a:t>10/29/2010</a:t>
+              <a:t>3/10/2011</a:t>
             </a:fld>
             <a:endParaRPr lang="en-US"/>
           </a:p>
@@ -3354,7 +3201,7 @@
             <a:fld id="{1D8BD707-D9CF-40AE-B4C6-C98DA3205C09}" type="datetimeFigureOut">
               <a:rPr lang="en-US" smtClean="0"/>
               <a:pPr/>
-              <a:t>10/29/2010</a:t>
+              <a:t>3/10/2011</a:t>
             </a:fld>
             <a:endParaRPr lang="en-US"/>
           </a:p>
@@ -3597,7 +3444,7 @@
             <a:fld id="{1D8BD707-D9CF-40AE-B4C6-C98DA3205C09}" type="datetimeFigureOut">
               <a:rPr lang="en-US" smtClean="0"/>
               <a:pPr/>
-              <a:t>10/29/2010</a:t>
+              <a:t>3/10/2011</a:t>
             </a:fld>
             <a:endParaRPr lang="en-US"/>
           </a:p>
@@ -3882,7 +3729,7 @@
             <a:fld id="{1D8BD707-D9CF-40AE-B4C6-C98DA3205C09}" type="datetimeFigureOut">
               <a:rPr lang="en-US" smtClean="0"/>
               <a:pPr/>
-              <a:t>10/29/2010</a:t>
+              <a:t>3/10/2011</a:t>
             </a:fld>
             <a:endParaRPr lang="en-US"/>
           </a:p>
@@ -4301,7 +4148,7 @@
             <a:fld id="{1D8BD707-D9CF-40AE-B4C6-C98DA3205C09}" type="datetimeFigureOut">
               <a:rPr lang="en-US" smtClean="0"/>
               <a:pPr/>
-              <a:t>10/29/2010</a:t>
+              <a:t>3/10/2011</a:t>
             </a:fld>
             <a:endParaRPr lang="en-US"/>
           </a:p>
@@ -4416,7 +4263,7 @@
             <a:fld id="{1D8BD707-D9CF-40AE-B4C6-C98DA3205C09}" type="datetimeFigureOut">
               <a:rPr lang="en-US" smtClean="0"/>
               <a:pPr/>
-              <a:t>10/29/2010</a:t>
+              <a:t>3/10/2011</a:t>
             </a:fld>
             <a:endParaRPr lang="en-US"/>
           </a:p>
@@ -4508,7 +4355,7 @@
             <a:fld id="{1D8BD707-D9CF-40AE-B4C6-C98DA3205C09}" type="datetimeFigureOut">
               <a:rPr lang="en-US" smtClean="0"/>
               <a:pPr/>
-              <a:t>10/29/2010</a:t>
+              <a:t>3/10/2011</a:t>
             </a:fld>
             <a:endParaRPr lang="en-US"/>
           </a:p>
@@ -4782,7 +4629,7 @@
             <a:fld id="{1D8BD707-D9CF-40AE-B4C6-C98DA3205C09}" type="datetimeFigureOut">
               <a:rPr lang="en-US" smtClean="0"/>
               <a:pPr/>
-              <a:t>10/29/2010</a:t>
+              <a:t>3/10/2011</a:t>
             </a:fld>
             <a:endParaRPr lang="en-US"/>
           </a:p>
@@ -5032,7 +4879,7 @@
             <a:fld id="{1D8BD707-D9CF-40AE-B4C6-C98DA3205C09}" type="datetimeFigureOut">
               <a:rPr lang="en-US" smtClean="0"/>
               <a:pPr/>
-              <a:t>10/29/2010</a:t>
+              <a:t>3/10/2011</a:t>
             </a:fld>
             <a:endParaRPr lang="en-US"/>
           </a:p>
@@ -5242,7 +5089,7 @@
             <a:fld id="{1D8BD707-D9CF-40AE-B4C6-C98DA3205C09}" type="datetimeFigureOut">
               <a:rPr lang="en-US" smtClean="0"/>
               <a:pPr/>
-              <a:t>10/29/2010</a:t>
+              <a:t>3/10/2011</a:t>
             </a:fld>
             <a:endParaRPr lang="en-US"/>
           </a:p>
@@ -5620,8 +5467,8 @@
           <p:nvPr/>
         </p:nvGraphicFramePr>
         <p:xfrm>
-          <a:off x="381000" y="381000"/>
-          <a:ext cx="8229600" cy="6096000"/>
+          <a:off x="0" y="304800"/>
+          <a:ext cx="6400800" cy="6096000"/>
         </p:xfrm>
         <a:graphic>
           <a:graphicData uri="http://schemas.openxmlformats.org/drawingml/2006/diagram">
@@ -5629,6 +5476,110 @@
           </a:graphicData>
         </a:graphic>
       </p:graphicFrame>
+      <p:pic>
+        <p:nvPicPr>
+          <p:cNvPr id="1026" name="Picture 2"/>
+          <p:cNvPicPr>
+            <a:picLocks noChangeAspect="1" noChangeArrowheads="1"/>
+          </p:cNvPicPr>
+          <p:nvPr/>
+        </p:nvPicPr>
+        <p:blipFill>
+          <a:blip r:embed="rId6" cstate="print"/>
+          <a:srcRect/>
+          <a:stretch>
+            <a:fillRect/>
+          </a:stretch>
+        </p:blipFill>
+        <p:spPr bwMode="auto">
+          <a:xfrm>
+            <a:off x="6858000" y="3352800"/>
+            <a:ext cx="1600200" cy="1828800"/>
+          </a:xfrm>
+          <a:prstGeom prst="rect">
+            <a:avLst/>
+          </a:prstGeom>
+          <a:noFill/>
+        </p:spPr>
+      </p:pic>
+      <p:sp>
+        <p:nvSpPr>
+          <p:cNvPr id="5" name="Left-Right Arrow 4"/>
+          <p:cNvSpPr/>
+          <p:nvPr/>
+        </p:nvSpPr>
+        <p:spPr>
+          <a:xfrm>
+            <a:off x="4953000" y="3886200"/>
+            <a:ext cx="1828800" cy="685800"/>
+          </a:xfrm>
+          <a:prstGeom prst="leftRightArrow">
+            <a:avLst/>
+          </a:prstGeom>
+        </p:spPr>
+        <p:style>
+          <a:lnRef idx="2">
+            <a:schemeClr val="accent1">
+              <a:shade val="50000"/>
+            </a:schemeClr>
+          </a:lnRef>
+          <a:fillRef idx="1">
+            <a:schemeClr val="accent1"/>
+          </a:fillRef>
+          <a:effectRef idx="0">
+            <a:schemeClr val="accent1"/>
+          </a:effectRef>
+          <a:fontRef idx="minor">
+            <a:schemeClr val="lt1"/>
+          </a:fontRef>
+        </p:style>
+        <p:txBody>
+          <a:bodyPr rtlCol="0" anchor="ctr"/>
+          <a:lstStyle/>
+          <a:p>
+            <a:pPr algn="ctr"/>
+            <a:endParaRPr lang="en-US"/>
+          </a:p>
+        </p:txBody>
+      </p:sp>
+      <p:sp>
+        <p:nvSpPr>
+          <p:cNvPr id="7" name="TextBox 6"/>
+          <p:cNvSpPr txBox="1"/>
+          <p:nvPr/>
+        </p:nvSpPr>
+        <p:spPr>
+          <a:xfrm>
+            <a:off x="6477000" y="5334000"/>
+            <a:ext cx="2438400" cy="646331"/>
+          </a:xfrm>
+          <a:prstGeom prst="rect">
+            <a:avLst/>
+          </a:prstGeom>
+          <a:noFill/>
+        </p:spPr>
+        <p:txBody>
+          <a:bodyPr wrap="square" rtlCol="0">
+            <a:spAutoFit/>
+          </a:bodyPr>
+          <a:lstStyle/>
+          <a:p>
+            <a:pPr algn="ctr"/>
+            <a:r>
+              <a:rPr lang="vi-VN" dirty="0" smtClean="0"/>
+              <a:t>Tập tin cấu hình </a:t>
+            </a:r>
+          </a:p>
+          <a:p>
+            <a:pPr algn="ctr"/>
+            <a:r>
+              <a:rPr lang="vi-VN" dirty="0" smtClean="0"/>
+              <a:t>ngữ nghĩa</a:t>
+            </a:r>
+            <a:endParaRPr lang="en-US" dirty="0"/>
+          </a:p>
+        </p:txBody>
+      </p:sp>
     </p:spTree>
   </p:cSld>
   <p:clrMapOvr>

</xml_diff>

<commit_message>
FINISH REPORT VERSION 1.8 (SAu khi nhận xét) - Mở đầu phương pháp
</commit_message>
<xml_diff>
--- a/De Cuong/cac buoc/process steps.pptx
+++ b/De Cuong/cac buoc/process steps.pptx
@@ -966,18 +966,32 @@
             <a:t> </a:t>
           </a:r>
           <a:r>
-            <a:rPr lang="en-US" dirty="0" smtClean="0">
+            <a:rPr lang="vi-VN" dirty="0" smtClean="0">
               <a:latin typeface="Times New Roman" pitchFamily="18" charset="0"/>
               <a:cs typeface="Times New Roman" pitchFamily="18" charset="0"/>
             </a:rPr>
-            <a:t>các bộ ba quan hệ về </a:t>
+            <a:t>trích </a:t>
           </a:r>
           <a:r>
             <a:rPr lang="en-US" dirty="0" smtClean="0">
               <a:latin typeface="Times New Roman" pitchFamily="18" charset="0"/>
               <a:cs typeface="Times New Roman" pitchFamily="18" charset="0"/>
             </a:rPr>
-            <a:t>từ</a:t>
+            <a:t>các </a:t>
+          </a:r>
+          <a:r>
+            <a:rPr lang="en-US" smtClean="0">
+              <a:latin typeface="Times New Roman" pitchFamily="18" charset="0"/>
+              <a:cs typeface="Times New Roman" pitchFamily="18" charset="0"/>
+            </a:rPr>
+            <a:t>bộ </a:t>
+          </a:r>
+          <a:r>
+            <a:rPr lang="en-US" smtClean="0">
+              <a:latin typeface="Times New Roman" pitchFamily="18" charset="0"/>
+              <a:cs typeface="Times New Roman" pitchFamily="18" charset="0"/>
+            </a:rPr>
+            <a:t>ba</a:t>
           </a:r>
           <a:endParaRPr lang="en-US" dirty="0" smtClean="0">
             <a:latin typeface="Times New Roman" pitchFamily="18" charset="0"/>
@@ -1011,66 +1025,6 @@
         </a:p>
       </dgm:t>
     </dgm:pt>
-    <dgm:pt modelId="{3439D3EC-A90B-48B4-8EA8-6DEA5D73F37B}">
-      <dgm:prSet phldrT="[Text]"/>
-      <dgm:spPr/>
-      <dgm:t>
-        <a:bodyPr/>
-        <a:lstStyle/>
-        <a:p>
-          <a:r>
-            <a:rPr lang="en-US" dirty="0" smtClean="0">
-              <a:latin typeface="Times New Roman" pitchFamily="18" charset="0"/>
-              <a:cs typeface="Times New Roman" pitchFamily="18" charset="0"/>
-            </a:rPr>
-            <a:t>Nhận diện thực </a:t>
-          </a:r>
-          <a:r>
-            <a:rPr lang="en-US" dirty="0" smtClean="0">
-              <a:latin typeface="Times New Roman" pitchFamily="18" charset="0"/>
-              <a:cs typeface="Times New Roman" pitchFamily="18" charset="0"/>
-            </a:rPr>
-            <a:t>thể</a:t>
-          </a:r>
-          <a:r>
-            <a:rPr lang="vi-VN" dirty="0" smtClean="0">
-              <a:latin typeface="Times New Roman" pitchFamily="18" charset="0"/>
-              <a:cs typeface="Times New Roman" pitchFamily="18" charset="0"/>
-            </a:rPr>
-            <a:t> trong bộ ba (có và không đặt tên)</a:t>
-          </a:r>
-          <a:endParaRPr lang="en-US" dirty="0">
-            <a:latin typeface="Times New Roman" pitchFamily="18" charset="0"/>
-            <a:cs typeface="Times New Roman" pitchFamily="18" charset="0"/>
-          </a:endParaRPr>
-        </a:p>
-      </dgm:t>
-    </dgm:pt>
-    <dgm:pt modelId="{8546BDE4-C2A0-4C13-9007-3B52C88A8727}" type="parTrans" cxnId="{A5CBA9E7-8FDA-464B-AE02-6A6FE82B7250}">
-      <dgm:prSet/>
-      <dgm:spPr/>
-      <dgm:t>
-        <a:bodyPr/>
-        <a:lstStyle/>
-        <a:p>
-          <a:endParaRPr lang="en-US"/>
-        </a:p>
-      </dgm:t>
-    </dgm:pt>
-    <dgm:pt modelId="{62BD4F90-76A6-4612-90D8-D94593503944}" type="sibTrans" cxnId="{A5CBA9E7-8FDA-464B-AE02-6A6FE82B7250}">
-      <dgm:prSet/>
-      <dgm:spPr/>
-      <dgm:t>
-        <a:bodyPr/>
-        <a:lstStyle/>
-        <a:p>
-          <a:endParaRPr lang="en-US">
-            <a:latin typeface="Times New Roman" pitchFamily="18" charset="0"/>
-            <a:cs typeface="Times New Roman" pitchFamily="18" charset="0"/>
-          </a:endParaRPr>
-        </a:p>
-      </dgm:t>
-    </dgm:pt>
     <dgm:pt modelId="{B9A2E75C-2A37-4F05-8B10-C43D4038B601}">
       <dgm:prSet/>
       <dgm:spPr/>
@@ -1083,14 +1037,7 @@
               <a:latin typeface="Times New Roman" pitchFamily="18" charset="0"/>
               <a:cs typeface="Times New Roman" pitchFamily="18" charset="0"/>
             </a:rPr>
-            <a:t>Sinh câu truy </a:t>
-          </a:r>
-          <a:r>
-            <a:rPr lang="en-US" dirty="0" smtClean="0">
-              <a:latin typeface="Times New Roman" pitchFamily="18" charset="0"/>
-              <a:cs typeface="Times New Roman" pitchFamily="18" charset="0"/>
-            </a:rPr>
-            <a:t>vấn</a:t>
+            <a:t>Sinh câu truy vấn</a:t>
           </a:r>
           <a:r>
             <a:rPr lang="vi-VN" dirty="0" smtClean="0">
@@ -1118,6 +1065,59 @@
       </dgm:t>
     </dgm:pt>
     <dgm:pt modelId="{60D96DE8-4CFD-4559-94BD-FA28AB9AAE76}" type="sibTrans" cxnId="{3A343D1A-2DDC-4331-9F41-75000945508D}">
+      <dgm:prSet/>
+      <dgm:spPr/>
+      <dgm:t>
+        <a:bodyPr/>
+        <a:lstStyle/>
+        <a:p>
+          <a:endParaRPr lang="en-US"/>
+        </a:p>
+      </dgm:t>
+    </dgm:pt>
+    <dgm:pt modelId="{3439D3EC-A90B-48B4-8EA8-6DEA5D73F37B}">
+      <dgm:prSet phldrT="[Text]"/>
+      <dgm:spPr/>
+      <dgm:t>
+        <a:bodyPr/>
+        <a:lstStyle/>
+        <a:p>
+          <a:r>
+            <a:rPr lang="en-US" dirty="0" smtClean="0">
+              <a:latin typeface="Times New Roman" pitchFamily="18" charset="0"/>
+              <a:cs typeface="Times New Roman" pitchFamily="18" charset="0"/>
+            </a:rPr>
+            <a:t>Nhận diện thực thể</a:t>
+          </a:r>
+          <a:r>
+            <a:rPr lang="vi-VN" dirty="0" smtClean="0">
+              <a:latin typeface="Times New Roman" pitchFamily="18" charset="0"/>
+              <a:cs typeface="Times New Roman" pitchFamily="18" charset="0"/>
+            </a:rPr>
+            <a:t> trong bộ ba (có và không đặt tên)</a:t>
+          </a:r>
+          <a:endParaRPr lang="en-US" dirty="0">
+            <a:latin typeface="Times New Roman" pitchFamily="18" charset="0"/>
+            <a:cs typeface="Times New Roman" pitchFamily="18" charset="0"/>
+          </a:endParaRPr>
+        </a:p>
+      </dgm:t>
+    </dgm:pt>
+    <dgm:pt modelId="{62BD4F90-76A6-4612-90D8-D94593503944}" type="sibTrans" cxnId="{A5CBA9E7-8FDA-464B-AE02-6A6FE82B7250}">
+      <dgm:prSet/>
+      <dgm:spPr/>
+      <dgm:t>
+        <a:bodyPr/>
+        <a:lstStyle/>
+        <a:p>
+          <a:endParaRPr lang="en-US">
+            <a:latin typeface="Times New Roman" pitchFamily="18" charset="0"/>
+            <a:cs typeface="Times New Roman" pitchFamily="18" charset="0"/>
+          </a:endParaRPr>
+        </a:p>
+      </dgm:t>
+    </dgm:pt>
+    <dgm:pt modelId="{8546BDE4-C2A0-4C13-9007-3B52C88A8727}" type="parTrans" cxnId="{A5CBA9E7-8FDA-464B-AE02-6A6FE82B7250}">
       <dgm:prSet/>
       <dgm:spPr/>
       <dgm:t>
@@ -1268,21 +1268,21 @@
     </dgm:pt>
   </dgm:ptLst>
   <dgm:cxnLst>
+    <dgm:cxn modelId="{8AE61842-16A9-42A6-B150-D972D3ED0869}" type="presOf" srcId="{478929E2-99EC-4AE0-AFE7-1AAF21D8B622}" destId="{2D1C8598-2B5B-4AA3-8E36-2F03079472FF}" srcOrd="0" destOrd="0" presId="urn:microsoft.com/office/officeart/2005/8/layout/process2"/>
+    <dgm:cxn modelId="{5F753FDB-3AE2-4856-9C11-CDD2C7A20504}" srcId="{0EBE70D1-20C7-4FE7-814C-39809FB9290B}" destId="{478929E2-99EC-4AE0-AFE7-1AAF21D8B622}" srcOrd="1" destOrd="0" parTransId="{29C3939D-FE7D-4B99-BC12-16D81A776031}" sibTransId="{67108C0B-BD79-4C86-A2E4-78DABE280CF0}"/>
+    <dgm:cxn modelId="{86CCCD49-C976-4FF7-9630-023CFD529736}" type="presOf" srcId="{3439D3EC-A90B-48B4-8EA8-6DEA5D73F37B}" destId="{2C8E7DB9-DCB7-4BCC-9886-19B1340507D7}" srcOrd="0" destOrd="0" presId="urn:microsoft.com/office/officeart/2005/8/layout/process2"/>
+    <dgm:cxn modelId="{6F9ADF0A-FD6F-4223-9915-0740AD692EC8}" srcId="{0EBE70D1-20C7-4FE7-814C-39809FB9290B}" destId="{C338B8CD-E314-48DF-838A-9678B83FA221}" srcOrd="0" destOrd="0" parTransId="{40867C9C-EDAC-4D93-B345-6A3F09C6F17B}" sibTransId="{F7EE5203-B160-4D37-B60F-1C623D5AA0E0}"/>
+    <dgm:cxn modelId="{A5CBA9E7-8FDA-464B-AE02-6A6FE82B7250}" srcId="{0EBE70D1-20C7-4FE7-814C-39809FB9290B}" destId="{3439D3EC-A90B-48B4-8EA8-6DEA5D73F37B}" srcOrd="2" destOrd="0" parTransId="{8546BDE4-C2A0-4C13-9007-3B52C88A8727}" sibTransId="{62BD4F90-76A6-4612-90D8-D94593503944}"/>
+    <dgm:cxn modelId="{68FA08D6-4FAA-4B82-B28B-1D04B023B6F7}" type="presOf" srcId="{62BD4F90-76A6-4612-90D8-D94593503944}" destId="{9BACAF84-635B-4545-A9C8-E22E6E65E02E}" srcOrd="1" destOrd="0" presId="urn:microsoft.com/office/officeart/2005/8/layout/process2"/>
+    <dgm:cxn modelId="{D015D72B-D670-4FBA-BEB4-B1832C7CA693}" type="presOf" srcId="{0EBE70D1-20C7-4FE7-814C-39809FB9290B}" destId="{4104CF59-F3EC-4A54-9679-E9C89C83A957}" srcOrd="0" destOrd="0" presId="urn:microsoft.com/office/officeart/2005/8/layout/process2"/>
+    <dgm:cxn modelId="{9B941D3E-911B-442E-AA48-B67C4858C4F8}" type="presOf" srcId="{C338B8CD-E314-48DF-838A-9678B83FA221}" destId="{120F9BAC-D73D-4896-9BB0-40EFD102C933}" srcOrd="0" destOrd="0" presId="urn:microsoft.com/office/officeart/2005/8/layout/process2"/>
+    <dgm:cxn modelId="{B3AB96B2-941E-4C46-9CBC-660735820737}" type="presOf" srcId="{62BD4F90-76A6-4612-90D8-D94593503944}" destId="{053F948B-7C8E-40B9-96A3-5E94C3021AA5}" srcOrd="0" destOrd="0" presId="urn:microsoft.com/office/officeart/2005/8/layout/process2"/>
+    <dgm:cxn modelId="{3A343D1A-2DDC-4331-9F41-75000945508D}" srcId="{0EBE70D1-20C7-4FE7-814C-39809FB9290B}" destId="{B9A2E75C-2A37-4F05-8B10-C43D4038B601}" srcOrd="3" destOrd="0" parTransId="{6DEB5F52-C259-4304-826C-03A03ADEAF68}" sibTransId="{60D96DE8-4CFD-4559-94BD-FA28AB9AAE76}"/>
+    <dgm:cxn modelId="{2BF18CAE-576D-46AF-AD0B-E8DC35D7A5B6}" type="presOf" srcId="{67108C0B-BD79-4C86-A2E4-78DABE280CF0}" destId="{3C66EC79-7A1A-4ED2-9C35-02A322D1B7FE}" srcOrd="0" destOrd="0" presId="urn:microsoft.com/office/officeart/2005/8/layout/process2"/>
+    <dgm:cxn modelId="{CEFA06EA-90D2-4B87-870E-EDEE60CD131D}" type="presOf" srcId="{F7EE5203-B160-4D37-B60F-1C623D5AA0E0}" destId="{331F05E1-1792-4BBD-829F-61999F2FEB43}" srcOrd="1" destOrd="0" presId="urn:microsoft.com/office/officeart/2005/8/layout/process2"/>
     <dgm:cxn modelId="{721589C9-B10D-43DB-BCA1-604AB36B74FD}" type="presOf" srcId="{B9A2E75C-2A37-4F05-8B10-C43D4038B601}" destId="{1FE9FCF1-8C00-4B5E-AE32-8BBB25BF1CEC}" srcOrd="0" destOrd="0" presId="urn:microsoft.com/office/officeart/2005/8/layout/process2"/>
-    <dgm:cxn modelId="{5F753FDB-3AE2-4856-9C11-CDD2C7A20504}" srcId="{0EBE70D1-20C7-4FE7-814C-39809FB9290B}" destId="{478929E2-99EC-4AE0-AFE7-1AAF21D8B622}" srcOrd="1" destOrd="0" parTransId="{29C3939D-FE7D-4B99-BC12-16D81A776031}" sibTransId="{67108C0B-BD79-4C86-A2E4-78DABE280CF0}"/>
+    <dgm:cxn modelId="{D035FD12-F27A-42E1-B0F0-C92A88AB77DB}" type="presOf" srcId="{67108C0B-BD79-4C86-A2E4-78DABE280CF0}" destId="{247C4D88-C257-4291-90F5-2F0233267DB3}" srcOrd="1" destOrd="0" presId="urn:microsoft.com/office/officeart/2005/8/layout/process2"/>
     <dgm:cxn modelId="{A0D01E85-7E0C-41C2-AD65-1E268A47EA12}" type="presOf" srcId="{F7EE5203-B160-4D37-B60F-1C623D5AA0E0}" destId="{AAE06282-6344-42F3-94BC-B1E824288EAB}" srcOrd="0" destOrd="0" presId="urn:microsoft.com/office/officeart/2005/8/layout/process2"/>
-    <dgm:cxn modelId="{D035FD12-F27A-42E1-B0F0-C92A88AB77DB}" type="presOf" srcId="{67108C0B-BD79-4C86-A2E4-78DABE280CF0}" destId="{247C4D88-C257-4291-90F5-2F0233267DB3}" srcOrd="1" destOrd="0" presId="urn:microsoft.com/office/officeart/2005/8/layout/process2"/>
-    <dgm:cxn modelId="{B3AB96B2-941E-4C46-9CBC-660735820737}" type="presOf" srcId="{62BD4F90-76A6-4612-90D8-D94593503944}" destId="{053F948B-7C8E-40B9-96A3-5E94C3021AA5}" srcOrd="0" destOrd="0" presId="urn:microsoft.com/office/officeart/2005/8/layout/process2"/>
-    <dgm:cxn modelId="{6F9ADF0A-FD6F-4223-9915-0740AD692EC8}" srcId="{0EBE70D1-20C7-4FE7-814C-39809FB9290B}" destId="{C338B8CD-E314-48DF-838A-9678B83FA221}" srcOrd="0" destOrd="0" parTransId="{40867C9C-EDAC-4D93-B345-6A3F09C6F17B}" sibTransId="{F7EE5203-B160-4D37-B60F-1C623D5AA0E0}"/>
-    <dgm:cxn modelId="{3A343D1A-2DDC-4331-9F41-75000945508D}" srcId="{0EBE70D1-20C7-4FE7-814C-39809FB9290B}" destId="{B9A2E75C-2A37-4F05-8B10-C43D4038B601}" srcOrd="3" destOrd="0" parTransId="{6DEB5F52-C259-4304-826C-03A03ADEAF68}" sibTransId="{60D96DE8-4CFD-4559-94BD-FA28AB9AAE76}"/>
-    <dgm:cxn modelId="{68FA08D6-4FAA-4B82-B28B-1D04B023B6F7}" type="presOf" srcId="{62BD4F90-76A6-4612-90D8-D94593503944}" destId="{9BACAF84-635B-4545-A9C8-E22E6E65E02E}" srcOrd="1" destOrd="0" presId="urn:microsoft.com/office/officeart/2005/8/layout/process2"/>
-    <dgm:cxn modelId="{2BF18CAE-576D-46AF-AD0B-E8DC35D7A5B6}" type="presOf" srcId="{67108C0B-BD79-4C86-A2E4-78DABE280CF0}" destId="{3C66EC79-7A1A-4ED2-9C35-02A322D1B7FE}" srcOrd="0" destOrd="0" presId="urn:microsoft.com/office/officeart/2005/8/layout/process2"/>
-    <dgm:cxn modelId="{86CCCD49-C976-4FF7-9630-023CFD529736}" type="presOf" srcId="{3439D3EC-A90B-48B4-8EA8-6DEA5D73F37B}" destId="{2C8E7DB9-DCB7-4BCC-9886-19B1340507D7}" srcOrd="0" destOrd="0" presId="urn:microsoft.com/office/officeart/2005/8/layout/process2"/>
-    <dgm:cxn modelId="{8AE61842-16A9-42A6-B150-D972D3ED0869}" type="presOf" srcId="{478929E2-99EC-4AE0-AFE7-1AAF21D8B622}" destId="{2D1C8598-2B5B-4AA3-8E36-2F03079472FF}" srcOrd="0" destOrd="0" presId="urn:microsoft.com/office/officeart/2005/8/layout/process2"/>
-    <dgm:cxn modelId="{9B941D3E-911B-442E-AA48-B67C4858C4F8}" type="presOf" srcId="{C338B8CD-E314-48DF-838A-9678B83FA221}" destId="{120F9BAC-D73D-4896-9BB0-40EFD102C933}" srcOrd="0" destOrd="0" presId="urn:microsoft.com/office/officeart/2005/8/layout/process2"/>
-    <dgm:cxn modelId="{A5CBA9E7-8FDA-464B-AE02-6A6FE82B7250}" srcId="{0EBE70D1-20C7-4FE7-814C-39809FB9290B}" destId="{3439D3EC-A90B-48B4-8EA8-6DEA5D73F37B}" srcOrd="2" destOrd="0" parTransId="{8546BDE4-C2A0-4C13-9007-3B52C88A8727}" sibTransId="{62BD4F90-76A6-4612-90D8-D94593503944}"/>
-    <dgm:cxn modelId="{CEFA06EA-90D2-4B87-870E-EDEE60CD131D}" type="presOf" srcId="{F7EE5203-B160-4D37-B60F-1C623D5AA0E0}" destId="{331F05E1-1792-4BBD-829F-61999F2FEB43}" srcOrd="1" destOrd="0" presId="urn:microsoft.com/office/officeart/2005/8/layout/process2"/>
-    <dgm:cxn modelId="{D015D72B-D670-4FBA-BEB4-B1832C7CA693}" type="presOf" srcId="{0EBE70D1-20C7-4FE7-814C-39809FB9290B}" destId="{4104CF59-F3EC-4A54-9679-E9C89C83A957}" srcOrd="0" destOrd="0" presId="urn:microsoft.com/office/officeart/2005/8/layout/process2"/>
     <dgm:cxn modelId="{D94AA7F5-4E53-4A59-88BF-6B26A89523EF}" type="presParOf" srcId="{4104CF59-F3EC-4A54-9679-E9C89C83A957}" destId="{120F9BAC-D73D-4896-9BB0-40EFD102C933}" srcOrd="0" destOrd="0" presId="urn:microsoft.com/office/officeart/2005/8/layout/process2"/>
     <dgm:cxn modelId="{88F6C42C-C38C-4016-BD5F-5FA446907AC6}" type="presParOf" srcId="{4104CF59-F3EC-4A54-9679-E9C89C83A957}" destId="{AAE06282-6344-42F3-94BC-B1E824288EAB}" srcOrd="1" destOrd="0" presId="urn:microsoft.com/office/officeart/2005/8/layout/process2"/>
     <dgm:cxn modelId="{AB233745-C444-4189-9E10-6EF90D452BE3}" type="presParOf" srcId="{AAE06282-6344-42F3-94BC-B1E824288EAB}" destId="{331F05E1-1792-4BBD-829F-61999F2FEB43}" srcOrd="0" destOrd="0" presId="urn:microsoft.com/office/officeart/2005/8/layout/process2"/>

</xml_diff>

<commit_message>
FINISH REPORT VERSION 2.9.7(SAu khi nhận xét) - sửa lại các lý do cho các bước (50%)
</commit_message>
<xml_diff>
--- a/De Cuong/cac buoc/process steps.pptx
+++ b/De Cuong/cac buoc/process steps.pptx
@@ -1021,14 +1021,7 @@
               <a:latin typeface="Times New Roman" pitchFamily="18" charset="0"/>
               <a:cs typeface="Times New Roman" pitchFamily="18" charset="0"/>
             </a:rPr>
-            <a:t> </a:t>
-          </a:r>
-          <a:r>
-            <a:rPr lang="vi-VN" dirty="0" smtClean="0">
-              <a:latin typeface="Times New Roman" pitchFamily="18" charset="0"/>
-              <a:cs typeface="Times New Roman" pitchFamily="18" charset="0"/>
-            </a:rPr>
-            <a:t>SQL</a:t>
+            <a:t> SQL</a:t>
           </a:r>
           <a:r>
             <a:rPr lang="en-US" dirty="0" smtClean="0">
@@ -1169,7 +1162,7 @@
       <dgm:spPr/>
     </dgm:pt>
     <dgm:pt modelId="{120F9BAC-D73D-4896-9BB0-40EFD102C933}" type="pres">
-      <dgm:prSet presAssocID="{C338B8CD-E314-48DF-838A-9678B83FA221}" presName="node" presStyleLbl="node1" presStyleIdx="0" presStyleCnt="5" custScaleX="118154">
+      <dgm:prSet presAssocID="{C338B8CD-E314-48DF-838A-9678B83FA221}" presName="node" presStyleLbl="node1" presStyleIdx="0" presStyleCnt="5" custScaleX="84762">
         <dgm:presLayoutVars>
           <dgm:bulletEnabled val="1"/>
         </dgm:presLayoutVars>
@@ -1210,7 +1203,7 @@
       </dgm:t>
     </dgm:pt>
     <dgm:pt modelId="{EA482298-E4FD-43CC-8BB9-9607D49F1E4F}" type="pres">
-      <dgm:prSet presAssocID="{33ABBEB3-BDC5-44B7-9CF1-36D549B1EFA4}" presName="node" presStyleLbl="node1" presStyleIdx="1" presStyleCnt="5">
+      <dgm:prSet presAssocID="{33ABBEB3-BDC5-44B7-9CF1-36D549B1EFA4}" presName="node" presStyleLbl="node1" presStyleIdx="1" presStyleCnt="5" custScaleX="90413">
         <dgm:presLayoutVars>
           <dgm:bulletEnabled val="1"/>
         </dgm:presLayoutVars>
@@ -1227,13 +1220,27 @@
     <dgm:pt modelId="{45CF003D-CD3A-4FBB-92A8-ECBDFB8AE6F0}" type="pres">
       <dgm:prSet presAssocID="{E665A53D-6D36-4215-8A4C-2FADAAD2A78F}" presName="sibTrans" presStyleLbl="sibTrans2D1" presStyleIdx="1" presStyleCnt="4"/>
       <dgm:spPr/>
+      <dgm:t>
+        <a:bodyPr/>
+        <a:lstStyle/>
+        <a:p>
+          <a:endParaRPr lang="en-US"/>
+        </a:p>
+      </dgm:t>
     </dgm:pt>
     <dgm:pt modelId="{8FDDE47D-D1C4-4EA2-8C12-B0F04F5CD5F9}" type="pres">
       <dgm:prSet presAssocID="{E665A53D-6D36-4215-8A4C-2FADAAD2A78F}" presName="connectorText" presStyleLbl="sibTrans2D1" presStyleIdx="1" presStyleCnt="4"/>
       <dgm:spPr/>
+      <dgm:t>
+        <a:bodyPr/>
+        <a:lstStyle/>
+        <a:p>
+          <a:endParaRPr lang="en-US"/>
+        </a:p>
+      </dgm:t>
     </dgm:pt>
     <dgm:pt modelId="{2D1C8598-2B5B-4AA3-8E36-2F03079472FF}" type="pres">
-      <dgm:prSet presAssocID="{478929E2-99EC-4AE0-AFE7-1AAF21D8B622}" presName="node" presStyleLbl="node1" presStyleIdx="2" presStyleCnt="5">
+      <dgm:prSet presAssocID="{478929E2-99EC-4AE0-AFE7-1AAF21D8B622}" presName="node" presStyleLbl="node1" presStyleIdx="2" presStyleCnt="5" custScaleX="79111">
         <dgm:presLayoutVars>
           <dgm:bulletEnabled val="1"/>
         </dgm:presLayoutVars>
@@ -1323,25 +1330,25 @@
     </dgm:pt>
   </dgm:ptLst>
   <dgm:cxnLst>
-    <dgm:cxn modelId="{89A0C9F3-C098-48F9-BB28-15E3EFC33E14}" type="presOf" srcId="{33ABBEB3-BDC5-44B7-9CF1-36D549B1EFA4}" destId="{EA482298-E4FD-43CC-8BB9-9607D49F1E4F}" srcOrd="0" destOrd="0" presId="urn:microsoft.com/office/officeart/2005/8/layout/process2"/>
-    <dgm:cxn modelId="{8AE61842-16A9-42A6-B150-D972D3ED0869}" type="presOf" srcId="{478929E2-99EC-4AE0-AFE7-1AAF21D8B622}" destId="{2D1C8598-2B5B-4AA3-8E36-2F03079472FF}" srcOrd="0" destOrd="0" presId="urn:microsoft.com/office/officeart/2005/8/layout/process2"/>
-    <dgm:cxn modelId="{CEFA06EA-90D2-4B87-870E-EDEE60CD131D}" type="presOf" srcId="{F7EE5203-B160-4D37-B60F-1C623D5AA0E0}" destId="{331F05E1-1792-4BBD-829F-61999F2FEB43}" srcOrd="1" destOrd="0" presId="urn:microsoft.com/office/officeart/2005/8/layout/process2"/>
-    <dgm:cxn modelId="{3A343D1A-2DDC-4331-9F41-75000945508D}" srcId="{0EBE70D1-20C7-4FE7-814C-39809FB9290B}" destId="{B9A2E75C-2A37-4F05-8B10-C43D4038B601}" srcOrd="4" destOrd="0" parTransId="{6DEB5F52-C259-4304-826C-03A03ADEAF68}" sibTransId="{60D96DE8-4CFD-4559-94BD-FA28AB9AAE76}"/>
-    <dgm:cxn modelId="{A5CBA9E7-8FDA-464B-AE02-6A6FE82B7250}" srcId="{0EBE70D1-20C7-4FE7-814C-39809FB9290B}" destId="{3439D3EC-A90B-48B4-8EA8-6DEA5D73F37B}" srcOrd="3" destOrd="0" parTransId="{8546BDE4-C2A0-4C13-9007-3B52C88A8727}" sibTransId="{62BD4F90-76A6-4612-90D8-D94593503944}"/>
-    <dgm:cxn modelId="{68FA08D6-4FAA-4B82-B28B-1D04B023B6F7}" type="presOf" srcId="{62BD4F90-76A6-4612-90D8-D94593503944}" destId="{9BACAF84-635B-4545-A9C8-E22E6E65E02E}" srcOrd="1" destOrd="0" presId="urn:microsoft.com/office/officeart/2005/8/layout/process2"/>
-    <dgm:cxn modelId="{721589C9-B10D-43DB-BCA1-604AB36B74FD}" type="presOf" srcId="{B9A2E75C-2A37-4F05-8B10-C43D4038B601}" destId="{1FE9FCF1-8C00-4B5E-AE32-8BBB25BF1CEC}" srcOrd="0" destOrd="0" presId="urn:microsoft.com/office/officeart/2005/8/layout/process2"/>
-    <dgm:cxn modelId="{78E6D32B-A25D-4E8B-86B0-5BF8817DC2F4}" type="presOf" srcId="{E665A53D-6D36-4215-8A4C-2FADAAD2A78F}" destId="{8FDDE47D-D1C4-4EA2-8C12-B0F04F5CD5F9}" srcOrd="1" destOrd="0" presId="urn:microsoft.com/office/officeart/2005/8/layout/process2"/>
-    <dgm:cxn modelId="{2BF18CAE-576D-46AF-AD0B-E8DC35D7A5B6}" type="presOf" srcId="{67108C0B-BD79-4C86-A2E4-78DABE280CF0}" destId="{3C66EC79-7A1A-4ED2-9C35-02A322D1B7FE}" srcOrd="0" destOrd="0" presId="urn:microsoft.com/office/officeart/2005/8/layout/process2"/>
-    <dgm:cxn modelId="{007CD871-9CBF-465E-B6D9-F9CBE633C2AA}" type="presOf" srcId="{E665A53D-6D36-4215-8A4C-2FADAAD2A78F}" destId="{45CF003D-CD3A-4FBB-92A8-ECBDFB8AE6F0}" srcOrd="0" destOrd="0" presId="urn:microsoft.com/office/officeart/2005/8/layout/process2"/>
-    <dgm:cxn modelId="{6F9ADF0A-FD6F-4223-9915-0740AD692EC8}" srcId="{0EBE70D1-20C7-4FE7-814C-39809FB9290B}" destId="{C338B8CD-E314-48DF-838A-9678B83FA221}" srcOrd="0" destOrd="0" parTransId="{40867C9C-EDAC-4D93-B345-6A3F09C6F17B}" sibTransId="{F7EE5203-B160-4D37-B60F-1C623D5AA0E0}"/>
-    <dgm:cxn modelId="{9B941D3E-911B-442E-AA48-B67C4858C4F8}" type="presOf" srcId="{C338B8CD-E314-48DF-838A-9678B83FA221}" destId="{120F9BAC-D73D-4896-9BB0-40EFD102C933}" srcOrd="0" destOrd="0" presId="urn:microsoft.com/office/officeart/2005/8/layout/process2"/>
-    <dgm:cxn modelId="{D035FD12-F27A-42E1-B0F0-C92A88AB77DB}" type="presOf" srcId="{67108C0B-BD79-4C86-A2E4-78DABE280CF0}" destId="{247C4D88-C257-4291-90F5-2F0233267DB3}" srcOrd="1" destOrd="0" presId="urn:microsoft.com/office/officeart/2005/8/layout/process2"/>
-    <dgm:cxn modelId="{9BC30825-CEBF-4738-B251-9112D953D358}" srcId="{0EBE70D1-20C7-4FE7-814C-39809FB9290B}" destId="{33ABBEB3-BDC5-44B7-9CF1-36D549B1EFA4}" srcOrd="1" destOrd="0" parTransId="{7B802AE4-B827-491B-88FA-A50C749E1639}" sibTransId="{E665A53D-6D36-4215-8A4C-2FADAAD2A78F}"/>
-    <dgm:cxn modelId="{5F753FDB-3AE2-4856-9C11-CDD2C7A20504}" srcId="{0EBE70D1-20C7-4FE7-814C-39809FB9290B}" destId="{478929E2-99EC-4AE0-AFE7-1AAF21D8B622}" srcOrd="2" destOrd="0" parTransId="{29C3939D-FE7D-4B99-BC12-16D81A776031}" sibTransId="{67108C0B-BD79-4C86-A2E4-78DABE280CF0}"/>
     <dgm:cxn modelId="{A0D01E85-7E0C-41C2-AD65-1E268A47EA12}" type="presOf" srcId="{F7EE5203-B160-4D37-B60F-1C623D5AA0E0}" destId="{AAE06282-6344-42F3-94BC-B1E824288EAB}" srcOrd="0" destOrd="0" presId="urn:microsoft.com/office/officeart/2005/8/layout/process2"/>
     <dgm:cxn modelId="{D015D72B-D670-4FBA-BEB4-B1832C7CA693}" type="presOf" srcId="{0EBE70D1-20C7-4FE7-814C-39809FB9290B}" destId="{4104CF59-F3EC-4A54-9679-E9C89C83A957}" srcOrd="0" destOrd="0" presId="urn:microsoft.com/office/officeart/2005/8/layout/process2"/>
+    <dgm:cxn modelId="{68FA08D6-4FAA-4B82-B28B-1D04B023B6F7}" type="presOf" srcId="{62BD4F90-76A6-4612-90D8-D94593503944}" destId="{9BACAF84-635B-4545-A9C8-E22E6E65E02E}" srcOrd="1" destOrd="0" presId="urn:microsoft.com/office/officeart/2005/8/layout/process2"/>
+    <dgm:cxn modelId="{3A343D1A-2DDC-4331-9F41-75000945508D}" srcId="{0EBE70D1-20C7-4FE7-814C-39809FB9290B}" destId="{B9A2E75C-2A37-4F05-8B10-C43D4038B601}" srcOrd="4" destOrd="0" parTransId="{6DEB5F52-C259-4304-826C-03A03ADEAF68}" sibTransId="{60D96DE8-4CFD-4559-94BD-FA28AB9AAE76}"/>
+    <dgm:cxn modelId="{D035FD12-F27A-42E1-B0F0-C92A88AB77DB}" type="presOf" srcId="{67108C0B-BD79-4C86-A2E4-78DABE280CF0}" destId="{247C4D88-C257-4291-90F5-2F0233267DB3}" srcOrd="1" destOrd="0" presId="urn:microsoft.com/office/officeart/2005/8/layout/process2"/>
+    <dgm:cxn modelId="{8AE61842-16A9-42A6-B150-D972D3ED0869}" type="presOf" srcId="{478929E2-99EC-4AE0-AFE7-1AAF21D8B622}" destId="{2D1C8598-2B5B-4AA3-8E36-2F03079472FF}" srcOrd="0" destOrd="0" presId="urn:microsoft.com/office/officeart/2005/8/layout/process2"/>
+    <dgm:cxn modelId="{86CCCD49-C976-4FF7-9630-023CFD529736}" type="presOf" srcId="{3439D3EC-A90B-48B4-8EA8-6DEA5D73F37B}" destId="{2C8E7DB9-DCB7-4BCC-9886-19B1340507D7}" srcOrd="0" destOrd="0" presId="urn:microsoft.com/office/officeart/2005/8/layout/process2"/>
+    <dgm:cxn modelId="{9B941D3E-911B-442E-AA48-B67C4858C4F8}" type="presOf" srcId="{C338B8CD-E314-48DF-838A-9678B83FA221}" destId="{120F9BAC-D73D-4896-9BB0-40EFD102C933}" srcOrd="0" destOrd="0" presId="urn:microsoft.com/office/officeart/2005/8/layout/process2"/>
+    <dgm:cxn modelId="{89A0C9F3-C098-48F9-BB28-15E3EFC33E14}" type="presOf" srcId="{33ABBEB3-BDC5-44B7-9CF1-36D549B1EFA4}" destId="{EA482298-E4FD-43CC-8BB9-9607D49F1E4F}" srcOrd="0" destOrd="0" presId="urn:microsoft.com/office/officeart/2005/8/layout/process2"/>
+    <dgm:cxn modelId="{721589C9-B10D-43DB-BCA1-604AB36B74FD}" type="presOf" srcId="{B9A2E75C-2A37-4F05-8B10-C43D4038B601}" destId="{1FE9FCF1-8C00-4B5E-AE32-8BBB25BF1CEC}" srcOrd="0" destOrd="0" presId="urn:microsoft.com/office/officeart/2005/8/layout/process2"/>
+    <dgm:cxn modelId="{CEFA06EA-90D2-4B87-870E-EDEE60CD131D}" type="presOf" srcId="{F7EE5203-B160-4D37-B60F-1C623D5AA0E0}" destId="{331F05E1-1792-4BBD-829F-61999F2FEB43}" srcOrd="1" destOrd="0" presId="urn:microsoft.com/office/officeart/2005/8/layout/process2"/>
+    <dgm:cxn modelId="{78E6D32B-A25D-4E8B-86B0-5BF8817DC2F4}" type="presOf" srcId="{E665A53D-6D36-4215-8A4C-2FADAAD2A78F}" destId="{8FDDE47D-D1C4-4EA2-8C12-B0F04F5CD5F9}" srcOrd="1" destOrd="0" presId="urn:microsoft.com/office/officeart/2005/8/layout/process2"/>
+    <dgm:cxn modelId="{A5CBA9E7-8FDA-464B-AE02-6A6FE82B7250}" srcId="{0EBE70D1-20C7-4FE7-814C-39809FB9290B}" destId="{3439D3EC-A90B-48B4-8EA8-6DEA5D73F37B}" srcOrd="3" destOrd="0" parTransId="{8546BDE4-C2A0-4C13-9007-3B52C88A8727}" sibTransId="{62BD4F90-76A6-4612-90D8-D94593503944}"/>
+    <dgm:cxn modelId="{2BF18CAE-576D-46AF-AD0B-E8DC35D7A5B6}" type="presOf" srcId="{67108C0B-BD79-4C86-A2E4-78DABE280CF0}" destId="{3C66EC79-7A1A-4ED2-9C35-02A322D1B7FE}" srcOrd="0" destOrd="0" presId="urn:microsoft.com/office/officeart/2005/8/layout/process2"/>
     <dgm:cxn modelId="{B3AB96B2-941E-4C46-9CBC-660735820737}" type="presOf" srcId="{62BD4F90-76A6-4612-90D8-D94593503944}" destId="{053F948B-7C8E-40B9-96A3-5E94C3021AA5}" srcOrd="0" destOrd="0" presId="urn:microsoft.com/office/officeart/2005/8/layout/process2"/>
-    <dgm:cxn modelId="{86CCCD49-C976-4FF7-9630-023CFD529736}" type="presOf" srcId="{3439D3EC-A90B-48B4-8EA8-6DEA5D73F37B}" destId="{2C8E7DB9-DCB7-4BCC-9886-19B1340507D7}" srcOrd="0" destOrd="0" presId="urn:microsoft.com/office/officeart/2005/8/layout/process2"/>
+    <dgm:cxn modelId="{6F9ADF0A-FD6F-4223-9915-0740AD692EC8}" srcId="{0EBE70D1-20C7-4FE7-814C-39809FB9290B}" destId="{C338B8CD-E314-48DF-838A-9678B83FA221}" srcOrd="0" destOrd="0" parTransId="{40867C9C-EDAC-4D93-B345-6A3F09C6F17B}" sibTransId="{F7EE5203-B160-4D37-B60F-1C623D5AA0E0}"/>
+    <dgm:cxn modelId="{9BC30825-CEBF-4738-B251-9112D953D358}" srcId="{0EBE70D1-20C7-4FE7-814C-39809FB9290B}" destId="{33ABBEB3-BDC5-44B7-9CF1-36D549B1EFA4}" srcOrd="1" destOrd="0" parTransId="{7B802AE4-B827-491B-88FA-A50C749E1639}" sibTransId="{E665A53D-6D36-4215-8A4C-2FADAAD2A78F}"/>
+    <dgm:cxn modelId="{007CD871-9CBF-465E-B6D9-F9CBE633C2AA}" type="presOf" srcId="{E665A53D-6D36-4215-8A4C-2FADAAD2A78F}" destId="{45CF003D-CD3A-4FBB-92A8-ECBDFB8AE6F0}" srcOrd="0" destOrd="0" presId="urn:microsoft.com/office/officeart/2005/8/layout/process2"/>
+    <dgm:cxn modelId="{5F753FDB-3AE2-4856-9C11-CDD2C7A20504}" srcId="{0EBE70D1-20C7-4FE7-814C-39809FB9290B}" destId="{478929E2-99EC-4AE0-AFE7-1AAF21D8B622}" srcOrd="2" destOrd="0" parTransId="{29C3939D-FE7D-4B99-BC12-16D81A776031}" sibTransId="{67108C0B-BD79-4C86-A2E4-78DABE280CF0}"/>
     <dgm:cxn modelId="{D94AA7F5-4E53-4A59-88BF-6B26A89523EF}" type="presParOf" srcId="{4104CF59-F3EC-4A54-9679-E9C89C83A957}" destId="{120F9BAC-D73D-4896-9BB0-40EFD102C933}" srcOrd="0" destOrd="0" presId="urn:microsoft.com/office/officeart/2005/8/layout/process2"/>
     <dgm:cxn modelId="{88F6C42C-C38C-4016-BD5F-5FA446907AC6}" type="presParOf" srcId="{4104CF59-F3EC-4A54-9679-E9C89C83A957}" destId="{AAE06282-6344-42F3-94BC-B1E824288EAB}" srcOrd="1" destOrd="0" presId="urn:microsoft.com/office/officeart/2005/8/layout/process2"/>
     <dgm:cxn modelId="{AB233745-C444-4189-9E10-6EF90D452BE3}" type="presParOf" srcId="{AAE06282-6344-42F3-94BC-B1E824288EAB}" destId="{331F05E1-1792-4BBD-829F-61999F2FEB43}" srcOrd="0" destOrd="0" presId="urn:microsoft.com/office/officeart/2005/8/layout/process2"/>
@@ -2752,7 +2759,7 @@
             <a:fld id="{1D8BD707-D9CF-40AE-B4C6-C98DA3205C09}" type="datetimeFigureOut">
               <a:rPr lang="en-US" smtClean="0"/>
               <a:pPr/>
-              <a:t>3/17/2011</a:t>
+              <a:t>3/20/2011</a:t>
             </a:fld>
             <a:endParaRPr lang="en-US"/>
           </a:p>
@@ -2919,7 +2926,7 @@
             <a:fld id="{1D8BD707-D9CF-40AE-B4C6-C98DA3205C09}" type="datetimeFigureOut">
               <a:rPr lang="en-US" smtClean="0"/>
               <a:pPr/>
-              <a:t>3/17/2011</a:t>
+              <a:t>3/20/2011</a:t>
             </a:fld>
             <a:endParaRPr lang="en-US"/>
           </a:p>
@@ -3096,7 +3103,7 @@
             <a:fld id="{1D8BD707-D9CF-40AE-B4C6-C98DA3205C09}" type="datetimeFigureOut">
               <a:rPr lang="en-US" smtClean="0"/>
               <a:pPr/>
-              <a:t>3/17/2011</a:t>
+              <a:t>3/20/2011</a:t>
             </a:fld>
             <a:endParaRPr lang="en-US"/>
           </a:p>
@@ -3263,7 +3270,7 @@
             <a:fld id="{1D8BD707-D9CF-40AE-B4C6-C98DA3205C09}" type="datetimeFigureOut">
               <a:rPr lang="en-US" smtClean="0"/>
               <a:pPr/>
-              <a:t>3/17/2011</a:t>
+              <a:t>3/20/2011</a:t>
             </a:fld>
             <a:endParaRPr lang="en-US"/>
           </a:p>
@@ -3506,7 +3513,7 @@
             <a:fld id="{1D8BD707-D9CF-40AE-B4C6-C98DA3205C09}" type="datetimeFigureOut">
               <a:rPr lang="en-US" smtClean="0"/>
               <a:pPr/>
-              <a:t>3/17/2011</a:t>
+              <a:t>3/20/2011</a:t>
             </a:fld>
             <a:endParaRPr lang="en-US"/>
           </a:p>
@@ -3791,7 +3798,7 @@
             <a:fld id="{1D8BD707-D9CF-40AE-B4C6-C98DA3205C09}" type="datetimeFigureOut">
               <a:rPr lang="en-US" smtClean="0"/>
               <a:pPr/>
-              <a:t>3/17/2011</a:t>
+              <a:t>3/20/2011</a:t>
             </a:fld>
             <a:endParaRPr lang="en-US"/>
           </a:p>
@@ -4210,7 +4217,7 @@
             <a:fld id="{1D8BD707-D9CF-40AE-B4C6-C98DA3205C09}" type="datetimeFigureOut">
               <a:rPr lang="en-US" smtClean="0"/>
               <a:pPr/>
-              <a:t>3/17/2011</a:t>
+              <a:t>3/20/2011</a:t>
             </a:fld>
             <a:endParaRPr lang="en-US"/>
           </a:p>
@@ -4325,7 +4332,7 @@
             <a:fld id="{1D8BD707-D9CF-40AE-B4C6-C98DA3205C09}" type="datetimeFigureOut">
               <a:rPr lang="en-US" smtClean="0"/>
               <a:pPr/>
-              <a:t>3/17/2011</a:t>
+              <a:t>3/20/2011</a:t>
             </a:fld>
             <a:endParaRPr lang="en-US"/>
           </a:p>
@@ -4417,7 +4424,7 @@
             <a:fld id="{1D8BD707-D9CF-40AE-B4C6-C98DA3205C09}" type="datetimeFigureOut">
               <a:rPr lang="en-US" smtClean="0"/>
               <a:pPr/>
-              <a:t>3/17/2011</a:t>
+              <a:t>3/20/2011</a:t>
             </a:fld>
             <a:endParaRPr lang="en-US"/>
           </a:p>
@@ -4691,7 +4698,7 @@
             <a:fld id="{1D8BD707-D9CF-40AE-B4C6-C98DA3205C09}" type="datetimeFigureOut">
               <a:rPr lang="en-US" smtClean="0"/>
               <a:pPr/>
-              <a:t>3/17/2011</a:t>
+              <a:t>3/20/2011</a:t>
             </a:fld>
             <a:endParaRPr lang="en-US"/>
           </a:p>
@@ -4941,7 +4948,7 @@
             <a:fld id="{1D8BD707-D9CF-40AE-B4C6-C98DA3205C09}" type="datetimeFigureOut">
               <a:rPr lang="en-US" smtClean="0"/>
               <a:pPr/>
-              <a:t>3/17/2011</a:t>
+              <a:t>3/20/2011</a:t>
             </a:fld>
             <a:endParaRPr lang="en-US"/>
           </a:p>
@@ -5151,7 +5158,7 @@
             <a:fld id="{1D8BD707-D9CF-40AE-B4C6-C98DA3205C09}" type="datetimeFigureOut">
               <a:rPr lang="en-US" smtClean="0"/>
               <a:pPr/>
-              <a:t>3/17/2011</a:t>
+              <a:t>3/20/2011</a:t>
             </a:fld>
             <a:endParaRPr lang="en-US"/>
           </a:p>
@@ -5529,7 +5536,7 @@
           <p:nvPr/>
         </p:nvGraphicFramePr>
         <p:xfrm>
-          <a:off x="0" y="304800"/>
+          <a:off x="838200" y="304800"/>
           <a:ext cx="6400800" cy="6096000"/>
         </p:xfrm>
         <a:graphic>
@@ -5555,7 +5562,7 @@
         </p:blipFill>
         <p:spPr bwMode="auto">
           <a:xfrm>
-            <a:off x="6553200" y="4267200"/>
+            <a:off x="6858000" y="4267200"/>
             <a:ext cx="1600200" cy="1828800"/>
           </a:xfrm>
           <a:prstGeom prst="rect">
@@ -5572,7 +5579,7 @@
         </p:nvSpPr>
         <p:spPr>
           <a:xfrm>
-            <a:off x="4724400" y="4267200"/>
+            <a:off x="4953000" y="4343400"/>
             <a:ext cx="1828800" cy="685800"/>
           </a:xfrm>
           <a:prstGeom prst="leftRightArrow">
@@ -5650,8 +5657,8 @@
         </p:nvSpPr>
         <p:spPr>
           <a:xfrm>
-            <a:off x="4724400" y="5486400"/>
-            <a:ext cx="1828800" cy="685800"/>
+            <a:off x="5029200" y="5562600"/>
+            <a:ext cx="1676400" cy="685800"/>
           </a:xfrm>
           <a:prstGeom prst="leftRightArrow">
             <a:avLst/>
@@ -5682,6 +5689,372 @@
           </a:p>
         </p:txBody>
       </p:sp>
+      <p:grpSp>
+        <p:nvGrpSpPr>
+          <p:cNvPr id="11" name="Group 10"/>
+          <p:cNvGrpSpPr/>
+          <p:nvPr/>
+        </p:nvGrpSpPr>
+        <p:grpSpPr>
+          <a:xfrm>
+            <a:off x="1219200" y="2743200"/>
+            <a:ext cx="1219200" cy="794444"/>
+            <a:chOff x="1851921" y="1306710"/>
+            <a:chExt cx="2696957" cy="870644"/>
+          </a:xfrm>
+          <a:scene3d>
+            <a:camera prst="orthographicFront"/>
+            <a:lightRig rig="flat" dir="t"/>
+          </a:scene3d>
+        </p:grpSpPr>
+        <p:sp>
+          <p:nvSpPr>
+            <p:cNvPr id="12" name="Rounded Rectangle 11"/>
+            <p:cNvSpPr/>
+            <p:nvPr/>
+          </p:nvSpPr>
+          <p:spPr>
+            <a:xfrm>
+              <a:off x="1851921" y="1306710"/>
+              <a:ext cx="2696957" cy="870644"/>
+            </a:xfrm>
+            <a:prstGeom prst="roundRect">
+              <a:avLst>
+                <a:gd name="adj" fmla="val 10000"/>
+              </a:avLst>
+            </a:prstGeom>
+            <a:sp3d prstMaterial="dkEdge">
+              <a:bevelT w="8200" h="38100"/>
+            </a:sp3d>
+          </p:spPr>
+          <p:style>
+            <a:lnRef idx="0">
+              <a:schemeClr val="lt1">
+                <a:hueOff val="0"/>
+                <a:satOff val="0"/>
+                <a:lumOff val="0"/>
+                <a:alphaOff val="0"/>
+              </a:schemeClr>
+            </a:lnRef>
+            <a:fillRef idx="2">
+              <a:schemeClr val="accent1">
+                <a:hueOff val="0"/>
+                <a:satOff val="0"/>
+                <a:lumOff val="0"/>
+                <a:alphaOff val="0"/>
+              </a:schemeClr>
+            </a:fillRef>
+            <a:effectRef idx="1">
+              <a:schemeClr val="accent1">
+                <a:hueOff val="0"/>
+                <a:satOff val="0"/>
+                <a:lumOff val="0"/>
+                <a:alphaOff val="0"/>
+              </a:schemeClr>
+            </a:effectRef>
+            <a:fontRef idx="minor">
+              <a:schemeClr val="dk1"/>
+            </a:fontRef>
+          </p:style>
+        </p:sp>
+        <p:sp>
+          <p:nvSpPr>
+            <p:cNvPr id="13" name="Rounded Rectangle 4"/>
+            <p:cNvSpPr/>
+            <p:nvPr/>
+          </p:nvSpPr>
+          <p:spPr>
+            <a:xfrm>
+              <a:off x="1877421" y="1332210"/>
+              <a:ext cx="2645957" cy="819644"/>
+            </a:xfrm>
+            <a:prstGeom prst="rect">
+              <a:avLst/>
+            </a:prstGeom>
+            <a:sp3d/>
+          </p:spPr>
+          <p:style>
+            <a:lnRef idx="0">
+              <a:scrgbClr r="0" g="0" b="0"/>
+            </a:lnRef>
+            <a:fillRef idx="0">
+              <a:scrgbClr r="0" g="0" b="0"/>
+            </a:fillRef>
+            <a:effectRef idx="0">
+              <a:scrgbClr r="0" g="0" b="0"/>
+            </a:effectRef>
+            <a:fontRef idx="minor">
+              <a:schemeClr val="dk1"/>
+            </a:fontRef>
+          </p:style>
+          <p:txBody>
+            <a:bodyPr spcFirstLastPara="0" vert="horz" wrap="square" lIns="68580" tIns="68580" rIns="68580" bIns="68580" numCol="1" spcCol="1270" anchor="ctr" anchorCtr="0">
+              <a:noAutofit/>
+            </a:bodyPr>
+            <a:lstStyle/>
+            <a:p>
+              <a:pPr lvl="0" algn="ctr" defTabSz="800100">
+                <a:lnSpc>
+                  <a:spcPct val="90000"/>
+                </a:lnSpc>
+                <a:spcBef>
+                  <a:spcPct val="0"/>
+                </a:spcBef>
+                <a:spcAft>
+                  <a:spcPct val="35000"/>
+                </a:spcAft>
+              </a:pPr>
+              <a:r>
+                <a:rPr lang="vi-VN" sz="1800" b="0" kern="1200" dirty="0" smtClean="0">
+                  <a:latin typeface="+mj-lt"/>
+                </a:rPr>
+                <a:t>Phân loại câu hỏi</a:t>
+              </a:r>
+              <a:endParaRPr lang="en-US" sz="1800" b="0" kern="1200" dirty="0">
+                <a:latin typeface="+mj-lt"/>
+              </a:endParaRPr>
+            </a:p>
+          </p:txBody>
+        </p:sp>
+      </p:grpSp>
+      <p:grpSp>
+        <p:nvGrpSpPr>
+          <p:cNvPr id="14" name="Group 13"/>
+          <p:cNvGrpSpPr/>
+          <p:nvPr/>
+        </p:nvGrpSpPr>
+        <p:grpSpPr>
+          <a:xfrm rot="3805722">
+            <a:off x="2609582" y="2165227"/>
+            <a:ext cx="391790" cy="795302"/>
+            <a:chOff x="3004505" y="925803"/>
+            <a:chExt cx="391790" cy="326491"/>
+          </a:xfrm>
+        </p:grpSpPr>
+        <p:sp>
+          <p:nvSpPr>
+            <p:cNvPr id="15" name="Right Arrow 14"/>
+            <p:cNvSpPr/>
+            <p:nvPr/>
+          </p:nvSpPr>
+          <p:spPr>
+            <a:xfrm rot="5400000">
+              <a:off x="3037154" y="893154"/>
+              <a:ext cx="326491" cy="391790"/>
+            </a:xfrm>
+            <a:prstGeom prst="rightArrow">
+              <a:avLst>
+                <a:gd name="adj1" fmla="val 60000"/>
+                <a:gd name="adj2" fmla="val 50000"/>
+              </a:avLst>
+            </a:prstGeom>
+          </p:spPr>
+          <p:style>
+            <a:lnRef idx="0">
+              <a:schemeClr val="accent1">
+                <a:tint val="60000"/>
+                <a:hueOff val="0"/>
+                <a:satOff val="0"/>
+                <a:lumOff val="0"/>
+                <a:alphaOff val="0"/>
+              </a:schemeClr>
+            </a:lnRef>
+            <a:fillRef idx="2">
+              <a:schemeClr val="accent1">
+                <a:tint val="60000"/>
+                <a:hueOff val="0"/>
+                <a:satOff val="0"/>
+                <a:lumOff val="0"/>
+                <a:alphaOff val="0"/>
+              </a:schemeClr>
+            </a:fillRef>
+            <a:effectRef idx="1">
+              <a:schemeClr val="accent1">
+                <a:tint val="60000"/>
+                <a:hueOff val="0"/>
+                <a:satOff val="0"/>
+                <a:lumOff val="0"/>
+                <a:alphaOff val="0"/>
+              </a:schemeClr>
+            </a:effectRef>
+            <a:fontRef idx="minor">
+              <a:schemeClr val="dk1"/>
+            </a:fontRef>
+          </p:style>
+        </p:sp>
+        <p:sp>
+          <p:nvSpPr>
+            <p:cNvPr id="16" name="Right Arrow 4"/>
+            <p:cNvSpPr/>
+            <p:nvPr/>
+          </p:nvSpPr>
+          <p:spPr>
+            <a:xfrm>
+              <a:off x="3082863" y="925804"/>
+              <a:ext cx="235074" cy="228544"/>
+            </a:xfrm>
+            <a:prstGeom prst="rect">
+              <a:avLst/>
+            </a:prstGeom>
+          </p:spPr>
+          <p:style>
+            <a:lnRef idx="0">
+              <a:scrgbClr r="0" g="0" b="0"/>
+            </a:lnRef>
+            <a:fillRef idx="0">
+              <a:scrgbClr r="0" g="0" b="0"/>
+            </a:fillRef>
+            <a:effectRef idx="0">
+              <a:scrgbClr r="0" g="0" b="0"/>
+            </a:effectRef>
+            <a:fontRef idx="minor">
+              <a:schemeClr val="dk1"/>
+            </a:fontRef>
+          </p:style>
+          <p:txBody>
+            <a:bodyPr spcFirstLastPara="0" vert="horz" wrap="square" lIns="0" tIns="0" rIns="0" bIns="0" numCol="1" spcCol="1270" anchor="ctr" anchorCtr="0">
+              <a:noAutofit/>
+            </a:bodyPr>
+            <a:lstStyle/>
+            <a:p>
+              <a:pPr lvl="0" algn="ctr" defTabSz="577850">
+                <a:lnSpc>
+                  <a:spcPct val="90000"/>
+                </a:lnSpc>
+                <a:spcBef>
+                  <a:spcPct val="0"/>
+                </a:spcBef>
+                <a:spcAft>
+                  <a:spcPct val="35000"/>
+                </a:spcAft>
+              </a:pPr>
+              <a:endParaRPr lang="en-US" sz="1300" kern="1200">
+                <a:latin typeface="Times New Roman" pitchFamily="18" charset="0"/>
+                <a:cs typeface="Times New Roman" pitchFamily="18" charset="0"/>
+              </a:endParaRPr>
+            </a:p>
+          </p:txBody>
+        </p:sp>
+      </p:grpSp>
+      <p:grpSp>
+        <p:nvGrpSpPr>
+          <p:cNvPr id="17" name="Group 16"/>
+          <p:cNvGrpSpPr/>
+          <p:nvPr/>
+        </p:nvGrpSpPr>
+        <p:grpSpPr>
+          <a:xfrm rot="19865743">
+            <a:off x="2235268" y="3697800"/>
+            <a:ext cx="391790" cy="2098162"/>
+            <a:chOff x="3004505" y="925803"/>
+            <a:chExt cx="391790" cy="326491"/>
+          </a:xfrm>
+        </p:grpSpPr>
+        <p:sp>
+          <p:nvSpPr>
+            <p:cNvPr id="18" name="Right Arrow 17"/>
+            <p:cNvSpPr/>
+            <p:nvPr/>
+          </p:nvSpPr>
+          <p:spPr>
+            <a:xfrm rot="5400000">
+              <a:off x="3037154" y="893154"/>
+              <a:ext cx="326491" cy="391790"/>
+            </a:xfrm>
+            <a:prstGeom prst="rightArrow">
+              <a:avLst>
+                <a:gd name="adj1" fmla="val 60000"/>
+                <a:gd name="adj2" fmla="val 50000"/>
+              </a:avLst>
+            </a:prstGeom>
+          </p:spPr>
+          <p:style>
+            <a:lnRef idx="0">
+              <a:schemeClr val="accent1">
+                <a:tint val="60000"/>
+                <a:hueOff val="0"/>
+                <a:satOff val="0"/>
+                <a:lumOff val="0"/>
+                <a:alphaOff val="0"/>
+              </a:schemeClr>
+            </a:lnRef>
+            <a:fillRef idx="2">
+              <a:schemeClr val="accent1">
+                <a:tint val="60000"/>
+                <a:hueOff val="0"/>
+                <a:satOff val="0"/>
+                <a:lumOff val="0"/>
+                <a:alphaOff val="0"/>
+              </a:schemeClr>
+            </a:fillRef>
+            <a:effectRef idx="1">
+              <a:schemeClr val="accent1">
+                <a:tint val="60000"/>
+                <a:hueOff val="0"/>
+                <a:satOff val="0"/>
+                <a:lumOff val="0"/>
+                <a:alphaOff val="0"/>
+              </a:schemeClr>
+            </a:effectRef>
+            <a:fontRef idx="minor">
+              <a:schemeClr val="dk1"/>
+            </a:fontRef>
+          </p:style>
+        </p:sp>
+        <p:sp>
+          <p:nvSpPr>
+            <p:cNvPr id="19" name="Right Arrow 4"/>
+            <p:cNvSpPr/>
+            <p:nvPr/>
+          </p:nvSpPr>
+          <p:spPr>
+            <a:xfrm>
+              <a:off x="3082863" y="925804"/>
+              <a:ext cx="235074" cy="228544"/>
+            </a:xfrm>
+            <a:prstGeom prst="rect">
+              <a:avLst/>
+            </a:prstGeom>
+          </p:spPr>
+          <p:style>
+            <a:lnRef idx="0">
+              <a:scrgbClr r="0" g="0" b="0"/>
+            </a:lnRef>
+            <a:fillRef idx="0">
+              <a:scrgbClr r="0" g="0" b="0"/>
+            </a:fillRef>
+            <a:effectRef idx="0">
+              <a:scrgbClr r="0" g="0" b="0"/>
+            </a:effectRef>
+            <a:fontRef idx="minor">
+              <a:schemeClr val="dk1"/>
+            </a:fontRef>
+          </p:style>
+          <p:txBody>
+            <a:bodyPr spcFirstLastPara="0" vert="horz" wrap="square" lIns="0" tIns="0" rIns="0" bIns="0" numCol="1" spcCol="1270" anchor="ctr" anchorCtr="0">
+              <a:noAutofit/>
+            </a:bodyPr>
+            <a:lstStyle/>
+            <a:p>
+              <a:pPr lvl="0" algn="ctr" defTabSz="577850">
+                <a:lnSpc>
+                  <a:spcPct val="90000"/>
+                </a:lnSpc>
+                <a:spcBef>
+                  <a:spcPct val="0"/>
+                </a:spcBef>
+                <a:spcAft>
+                  <a:spcPct val="35000"/>
+                </a:spcAft>
+              </a:pPr>
+              <a:endParaRPr lang="en-US" sz="1300" kern="1200">
+                <a:latin typeface="Times New Roman" pitchFamily="18" charset="0"/>
+                <a:cs typeface="Times New Roman" pitchFamily="18" charset="0"/>
+              </a:endParaRPr>
+            </a:p>
+          </p:txBody>
+        </p:sp>
+      </p:grpSp>
     </p:spTree>
   </p:cSld>
   <p:clrMapOvr>

</xml_diff>